<commit_message>
[UPDATE] Complete 1 survey review
</commit_message>
<xml_diff>
--- a/slides/PredictiveMaintainance_Review.pptx
+++ b/slides/PredictiveMaintainance_Review.pptx
@@ -5,16 +5,17 @@
     <p:sldMasterId id="2147483648" r:id="rId1"/>
   </p:sldMasterIdLst>
   <p:notesMasterIdLst>
-    <p:notesMasterId r:id="rId9"/>
+    <p:notesMasterId r:id="rId10"/>
   </p:notesMasterIdLst>
   <p:sldIdLst>
     <p:sldId id="256" r:id="rId2"/>
     <p:sldId id="257" r:id="rId3"/>
     <p:sldId id="264" r:id="rId4"/>
-    <p:sldId id="258" r:id="rId5"/>
-    <p:sldId id="259" r:id="rId6"/>
-    <p:sldId id="262" r:id="rId7"/>
-    <p:sldId id="263" r:id="rId8"/>
+    <p:sldId id="265" r:id="rId5"/>
+    <p:sldId id="258" r:id="rId6"/>
+    <p:sldId id="259" r:id="rId7"/>
+    <p:sldId id="262" r:id="rId8"/>
+    <p:sldId id="263" r:id="rId9"/>
   </p:sldIdLst>
   <p:sldSz cx="12192000" cy="6858000"/>
   <p:notesSz cx="6858000" cy="9144000"/>
@@ -203,7 +204,7 @@
           <a:p>
             <a:fld id="{EC7EDE31-B92F-469B-850D-8F4273B434FD}" type="datetimeFigureOut">
               <a:rPr lang="en-GB" smtClean="0"/>
-              <a:t>07/09/2023</a:t>
+              <a:t>09/09/2023</a:t>
             </a:fld>
             <a:endParaRPr lang="en-GB"/>
           </a:p>
@@ -712,7 +713,7 @@
     </p:spTree>
     <p:extLst>
       <p:ext uri="{BB962C8B-B14F-4D97-AF65-F5344CB8AC3E}">
-        <p14:creationId xmlns:p14="http://schemas.microsoft.com/office/powerpoint/2010/main" val="38845902"/>
+        <p14:creationId xmlns:p14="http://schemas.microsoft.com/office/powerpoint/2010/main" val="1453024223"/>
       </p:ext>
     </p:extLst>
   </p:cSld>
@@ -796,7 +797,7 @@
     </p:spTree>
     <p:extLst>
       <p:ext uri="{BB962C8B-B14F-4D97-AF65-F5344CB8AC3E}">
-        <p14:creationId xmlns:p14="http://schemas.microsoft.com/office/powerpoint/2010/main" val="31023216"/>
+        <p14:creationId xmlns:p14="http://schemas.microsoft.com/office/powerpoint/2010/main" val="38845902"/>
       </p:ext>
     </p:extLst>
   </p:cSld>
@@ -880,7 +881,7 @@
     </p:spTree>
     <p:extLst>
       <p:ext uri="{BB962C8B-B14F-4D97-AF65-F5344CB8AC3E}">
-        <p14:creationId xmlns:p14="http://schemas.microsoft.com/office/powerpoint/2010/main" val="2036626409"/>
+        <p14:creationId xmlns:p14="http://schemas.microsoft.com/office/powerpoint/2010/main" val="31023216"/>
       </p:ext>
     </p:extLst>
   </p:cSld>
@@ -956,6 +957,90 @@
             <a:fld id="{33521128-C33F-4416-8772-FAD287CEF415}" type="slidenum">
               <a:rPr lang="en-GB" smtClean="0"/>
               <a:t>7</a:t>
+            </a:fld>
+            <a:endParaRPr lang="en-GB"/>
+          </a:p>
+        </p:txBody>
+      </p:sp>
+    </p:spTree>
+    <p:extLst>
+      <p:ext uri="{BB962C8B-B14F-4D97-AF65-F5344CB8AC3E}">
+        <p14:creationId xmlns:p14="http://schemas.microsoft.com/office/powerpoint/2010/main" val="2036626409"/>
+      </p:ext>
+    </p:extLst>
+  </p:cSld>
+  <p:clrMapOvr>
+    <a:masterClrMapping/>
+  </p:clrMapOvr>
+</p:notes>
+</file>
+
+<file path=ppt/notesSlides/notesSlide7.xml><?xml version="1.0" encoding="utf-8"?>
+<p:notes xmlns:a="http://schemas.openxmlformats.org/drawingml/2006/main" xmlns:r="http://schemas.openxmlformats.org/officeDocument/2006/relationships" xmlns:p="http://schemas.openxmlformats.org/presentationml/2006/main">
+  <p:cSld>
+    <p:spTree>
+      <p:nvGrpSpPr>
+        <p:cNvPr id="1" name=""/>
+        <p:cNvGrpSpPr/>
+        <p:nvPr/>
+      </p:nvGrpSpPr>
+      <p:grpSpPr>
+        <a:xfrm>
+          <a:off x="0" y="0"/>
+          <a:ext cx="0" cy="0"/>
+          <a:chOff x="0" y="0"/>
+          <a:chExt cx="0" cy="0"/>
+        </a:xfrm>
+      </p:grpSpPr>
+      <p:sp>
+        <p:nvSpPr>
+          <p:cNvPr id="2" name="Slide Image Placeholder 1"/>
+          <p:cNvSpPr>
+            <a:spLocks noGrp="1" noRot="1" noChangeAspect="1"/>
+          </p:cNvSpPr>
+          <p:nvPr>
+            <p:ph type="sldImg"/>
+          </p:nvPr>
+        </p:nvSpPr>
+        <p:spPr/>
+      </p:sp>
+      <p:sp>
+        <p:nvSpPr>
+          <p:cNvPr id="3" name="Notes Placeholder 2"/>
+          <p:cNvSpPr>
+            <a:spLocks noGrp="1"/>
+          </p:cNvSpPr>
+          <p:nvPr>
+            <p:ph type="body" idx="1"/>
+          </p:nvPr>
+        </p:nvSpPr>
+        <p:spPr/>
+        <p:txBody>
+          <a:bodyPr/>
+          <a:lstStyle/>
+          <a:p>
+            <a:endParaRPr lang="en-GB" dirty="0"/>
+          </a:p>
+        </p:txBody>
+      </p:sp>
+      <p:sp>
+        <p:nvSpPr>
+          <p:cNvPr id="4" name="Slide Number Placeholder 3"/>
+          <p:cNvSpPr>
+            <a:spLocks noGrp="1"/>
+          </p:cNvSpPr>
+          <p:nvPr>
+            <p:ph type="sldNum" sz="quarter" idx="5"/>
+          </p:nvPr>
+        </p:nvSpPr>
+        <p:spPr/>
+        <p:txBody>
+          <a:bodyPr/>
+          <a:lstStyle/>
+          <a:p>
+            <a:fld id="{33521128-C33F-4416-8772-FAD287CEF415}" type="slidenum">
+              <a:rPr lang="en-GB" smtClean="0"/>
+              <a:t>8</a:t>
             </a:fld>
             <a:endParaRPr lang="en-GB"/>
           </a:p>
@@ -1121,7 +1206,7 @@
           <a:p>
             <a:fld id="{008350BF-9569-438D-850F-FAFC28696C8F}" type="datetimeFigureOut">
               <a:rPr lang="en-GB" smtClean="0"/>
-              <a:t>07/09/2023</a:t>
+              <a:t>09/09/2023</a:t>
             </a:fld>
             <a:endParaRPr lang="en-GB"/>
           </a:p>
@@ -1319,7 +1404,7 @@
           <a:p>
             <a:fld id="{008350BF-9569-438D-850F-FAFC28696C8F}" type="datetimeFigureOut">
               <a:rPr lang="en-GB" smtClean="0"/>
-              <a:t>07/09/2023</a:t>
+              <a:t>09/09/2023</a:t>
             </a:fld>
             <a:endParaRPr lang="en-GB"/>
           </a:p>
@@ -1527,7 +1612,7 @@
           <a:p>
             <a:fld id="{008350BF-9569-438D-850F-FAFC28696C8F}" type="datetimeFigureOut">
               <a:rPr lang="en-GB" smtClean="0"/>
-              <a:t>07/09/2023</a:t>
+              <a:t>09/09/2023</a:t>
             </a:fld>
             <a:endParaRPr lang="en-GB"/>
           </a:p>
@@ -1725,7 +1810,7 @@
           <a:p>
             <a:fld id="{008350BF-9569-438D-850F-FAFC28696C8F}" type="datetimeFigureOut">
               <a:rPr lang="en-GB" smtClean="0"/>
-              <a:t>07/09/2023</a:t>
+              <a:t>09/09/2023</a:t>
             </a:fld>
             <a:endParaRPr lang="en-GB"/>
           </a:p>
@@ -2000,7 +2085,7 @@
           <a:p>
             <a:fld id="{008350BF-9569-438D-850F-FAFC28696C8F}" type="datetimeFigureOut">
               <a:rPr lang="en-GB" smtClean="0"/>
-              <a:t>07/09/2023</a:t>
+              <a:t>09/09/2023</a:t>
             </a:fld>
             <a:endParaRPr lang="en-GB"/>
           </a:p>
@@ -2265,7 +2350,7 @@
           <a:p>
             <a:fld id="{008350BF-9569-438D-850F-FAFC28696C8F}" type="datetimeFigureOut">
               <a:rPr lang="en-GB" smtClean="0"/>
-              <a:t>07/09/2023</a:t>
+              <a:t>09/09/2023</a:t>
             </a:fld>
             <a:endParaRPr lang="en-GB"/>
           </a:p>
@@ -2677,7 +2762,7 @@
           <a:p>
             <a:fld id="{008350BF-9569-438D-850F-FAFC28696C8F}" type="datetimeFigureOut">
               <a:rPr lang="en-GB" smtClean="0"/>
-              <a:t>07/09/2023</a:t>
+              <a:t>09/09/2023</a:t>
             </a:fld>
             <a:endParaRPr lang="en-GB"/>
           </a:p>
@@ -2818,7 +2903,7 @@
           <a:p>
             <a:fld id="{008350BF-9569-438D-850F-FAFC28696C8F}" type="datetimeFigureOut">
               <a:rPr lang="en-GB" smtClean="0"/>
-              <a:t>07/09/2023</a:t>
+              <a:t>09/09/2023</a:t>
             </a:fld>
             <a:endParaRPr lang="en-GB"/>
           </a:p>
@@ -2931,7 +3016,7 @@
           <a:p>
             <a:fld id="{008350BF-9569-438D-850F-FAFC28696C8F}" type="datetimeFigureOut">
               <a:rPr lang="en-GB" smtClean="0"/>
-              <a:t>07/09/2023</a:t>
+              <a:t>09/09/2023</a:t>
             </a:fld>
             <a:endParaRPr lang="en-GB"/>
           </a:p>
@@ -3242,7 +3327,7 @@
           <a:p>
             <a:fld id="{008350BF-9569-438D-850F-FAFC28696C8F}" type="datetimeFigureOut">
               <a:rPr lang="en-GB" smtClean="0"/>
-              <a:t>07/09/2023</a:t>
+              <a:t>09/09/2023</a:t>
             </a:fld>
             <a:endParaRPr lang="en-GB"/>
           </a:p>
@@ -3530,7 +3615,7 @@
           <a:p>
             <a:fld id="{008350BF-9569-438D-850F-FAFC28696C8F}" type="datetimeFigureOut">
               <a:rPr lang="en-GB" smtClean="0"/>
-              <a:t>07/09/2023</a:t>
+              <a:t>09/09/2023</a:t>
             </a:fld>
             <a:endParaRPr lang="en-GB"/>
           </a:p>
@@ -3771,7 +3856,7 @@
           <a:p>
             <a:fld id="{008350BF-9569-438D-850F-FAFC28696C8F}" type="datetimeFigureOut">
               <a:rPr lang="en-GB" smtClean="0"/>
-              <a:t>07/09/2023</a:t>
+              <a:t>09/09/2023</a:t>
             </a:fld>
             <a:endParaRPr lang="en-GB"/>
           </a:p>
@@ -4675,7 +4760,7 @@
           <p:nvPr/>
         </p:nvPicPr>
         <p:blipFill>
-          <a:blip r:embed="rId5">
+          <a:blip r:embed="rId5" cstate="hqprint">
             <a:extLst>
               <a:ext uri="{28A0092B-C50C-407E-A947-70E740481C1C}">
                 <a14:useLocalDpi xmlns:a14="http://schemas.microsoft.com/office/drawing/2010/main" val="0"/>
@@ -4707,6 +4792,44 @@
           </a:extLst>
         </p:spPr>
       </p:pic>
+      <p:sp>
+        <p:nvSpPr>
+          <p:cNvPr id="5" name="TextBox 4"/>
+          <p:cNvSpPr txBox="1"/>
+          <p:nvPr/>
+        </p:nvSpPr>
+        <p:spPr>
+          <a:xfrm>
+            <a:off x="10341205" y="6365385"/>
+            <a:ext cx="1941921" cy="369332"/>
+          </a:xfrm>
+          <a:prstGeom prst="rect">
+            <a:avLst/>
+          </a:prstGeom>
+          <a:noFill/>
+        </p:spPr>
+        <p:txBody>
+          <a:bodyPr wrap="square" rtlCol="0">
+            <a:spAutoFit/>
+          </a:bodyPr>
+          <a:lstStyle/>
+          <a:p>
+            <a:r>
+              <a:rPr lang="en-US" dirty="0" smtClean="0">
+                <a:solidFill>
+                  <a:srgbClr val="FF0000"/>
+                </a:solidFill>
+              </a:rPr>
+              <a:t>Review</a:t>
+            </a:r>
+            <a:r>
+              <a:rPr lang="en-US" dirty="0" smtClean="0"/>
+              <a:t>/ Methods</a:t>
+            </a:r>
+            <a:endParaRPr lang="en-US" dirty="0"/>
+          </a:p>
+        </p:txBody>
+      </p:sp>
     </p:spTree>
     <p:extLst>
       <p:ext uri="{BB962C8B-B14F-4D97-AF65-F5344CB8AC3E}">
@@ -4766,16 +4889,23 @@
           <a:lstStyle/>
           <a:p>
             <a:r>
-              <a:rPr lang="en-GB" sz="3200" dirty="0"/>
+              <a:rPr lang="en-GB" sz="3200" dirty="0">
+                <a:hlinkClick r:id="rId3"/>
+              </a:rPr>
               <a:t>Deep learning models for predictive maintenance: a survey, comparison,</a:t>
             </a:r>
             <a:br>
-              <a:rPr lang="en-GB" sz="3200" dirty="0"/>
+              <a:rPr lang="en-GB" sz="3200" dirty="0">
+                <a:hlinkClick r:id="rId3"/>
+              </a:rPr>
             </a:br>
             <a:r>
-              <a:rPr lang="en-GB" sz="3200" dirty="0"/>
+              <a:rPr lang="en-GB" sz="3200" dirty="0">
+                <a:hlinkClick r:id="rId3"/>
+              </a:rPr>
               <a:t>challenges and prospect</a:t>
             </a:r>
+            <a:endParaRPr lang="en-GB" sz="3200" dirty="0"/>
           </a:p>
         </p:txBody>
       </p:sp>
@@ -4951,7 +5081,7 @@
           <p:nvPr/>
         </p:nvPicPr>
         <p:blipFill>
-          <a:blip r:embed="rId3"/>
+          <a:blip r:embed="rId4"/>
           <a:stretch>
             <a:fillRect/>
           </a:stretch>
@@ -5050,7 +5180,7 @@
         <p:spPr>
           <a:xfrm>
             <a:off x="399143" y="4819295"/>
-            <a:ext cx="6945086" cy="1477328"/>
+            <a:ext cx="4465088" cy="1477328"/>
           </a:xfrm>
           <a:prstGeom prst="rect">
             <a:avLst/>
@@ -5075,7 +5205,15 @@
             </a:pPr>
             <a:r>
               <a:rPr lang="en-GB" dirty="0"/>
-              <a:t>Feed-forward/MLP                            - GAN</a:t>
+              <a:t>Feed-forward/MLP      </a:t>
+            </a:r>
+            <a:r>
+              <a:rPr lang="en-GB" dirty="0" smtClean="0"/>
+              <a:t> </a:t>
+            </a:r>
+            <a:r>
+              <a:rPr lang="en-GB" dirty="0"/>
+              <a:t>- GAN</a:t>
             </a:r>
           </a:p>
           <a:p>
@@ -5085,7 +5223,15 @@
             </a:pPr>
             <a:r>
               <a:rPr lang="en-GB" dirty="0"/>
-              <a:t>CNN                                                      - SOM </a:t>
+              <a:t>CNN                                </a:t>
+            </a:r>
+            <a:r>
+              <a:rPr lang="en-GB" dirty="0" smtClean="0"/>
+              <a:t> - </a:t>
+            </a:r>
+            <a:r>
+              <a:rPr lang="en-GB" dirty="0"/>
+              <a:t>SOM </a:t>
             </a:r>
           </a:p>
           <a:p>
@@ -5107,6 +5253,186 @@
               <a:rPr lang="en-GB" dirty="0"/>
               <a:t>AE/ Sparse AE</a:t>
             </a:r>
+          </a:p>
+        </p:txBody>
+      </p:sp>
+      <p:sp>
+        <p:nvSpPr>
+          <p:cNvPr id="9" name="TextBox 8"/>
+          <p:cNvSpPr txBox="1"/>
+          <p:nvPr/>
+        </p:nvSpPr>
+        <p:spPr>
+          <a:xfrm>
+            <a:off x="10250079" y="6381484"/>
+            <a:ext cx="1941921" cy="369332"/>
+          </a:xfrm>
+          <a:prstGeom prst="rect">
+            <a:avLst/>
+          </a:prstGeom>
+          <a:noFill/>
+        </p:spPr>
+        <p:txBody>
+          <a:bodyPr wrap="square" rtlCol="0">
+            <a:spAutoFit/>
+          </a:bodyPr>
+          <a:lstStyle/>
+          <a:p>
+            <a:r>
+              <a:rPr lang="en-US" dirty="0" smtClean="0">
+                <a:solidFill>
+                  <a:srgbClr val="FF0000"/>
+                </a:solidFill>
+              </a:rPr>
+              <a:t>Review</a:t>
+            </a:r>
+            <a:r>
+              <a:rPr lang="en-US" dirty="0" smtClean="0"/>
+              <a:t>/ Methods</a:t>
+            </a:r>
+            <a:endParaRPr lang="en-US" dirty="0"/>
+          </a:p>
+        </p:txBody>
+      </p:sp>
+      <p:sp>
+        <p:nvSpPr>
+          <p:cNvPr id="13" name="TextBox 12">
+            <a:extLst>
+              <a:ext uri="{FF2B5EF4-FFF2-40B4-BE49-F238E27FC236}">
+                <a16:creationId xmlns:a16="http://schemas.microsoft.com/office/drawing/2014/main" id="{0816D046-C6DE-14BC-5DEE-518ACA23A757}"/>
+              </a:ext>
+            </a:extLst>
+          </p:cNvPr>
+          <p:cNvSpPr txBox="1"/>
+          <p:nvPr/>
+        </p:nvSpPr>
+        <p:spPr>
+          <a:xfrm>
+            <a:off x="3863455" y="4807562"/>
+            <a:ext cx="5019287" cy="1477328"/>
+          </a:xfrm>
+          <a:prstGeom prst="rect">
+            <a:avLst/>
+          </a:prstGeom>
+          <a:noFill/>
+        </p:spPr>
+        <p:txBody>
+          <a:bodyPr wrap="square" rtlCol="0">
+            <a:spAutoFit/>
+          </a:bodyPr>
+          <a:lstStyle/>
+          <a:p>
+            <a:r>
+              <a:rPr lang="en-GB" dirty="0" smtClean="0"/>
+              <a:t>Dataset:</a:t>
+            </a:r>
+            <a:endParaRPr lang="en-GB" dirty="0"/>
+          </a:p>
+          <a:p>
+            <a:pPr marL="285750" indent="-285750">
+              <a:buFontTx/>
+              <a:buChar char="-"/>
+            </a:pPr>
+            <a:r>
+              <a:rPr lang="en-GB" dirty="0" smtClean="0">
+                <a:hlinkClick r:id="rId5"/>
+              </a:rPr>
+              <a:t>Milling dataset</a:t>
+            </a:r>
+            <a:r>
+              <a:rPr lang="en-GB" dirty="0" smtClean="0"/>
+              <a:t>                           </a:t>
+            </a:r>
+            <a:endParaRPr lang="en-GB" dirty="0"/>
+          </a:p>
+          <a:p>
+            <a:pPr marL="285750" indent="-285750">
+              <a:buFontTx/>
+              <a:buChar char="-"/>
+            </a:pPr>
+            <a:r>
+              <a:rPr lang="en-GB" dirty="0" smtClean="0">
+                <a:hlinkClick r:id="rId6"/>
+              </a:rPr>
+              <a:t>Bearing dataset</a:t>
+            </a:r>
+            <a:endParaRPr lang="en-GB" dirty="0"/>
+          </a:p>
+          <a:p>
+            <a:pPr marL="285750" indent="-285750">
+              <a:buFontTx/>
+              <a:buChar char="-"/>
+            </a:pPr>
+            <a:r>
+              <a:rPr lang="en-US" dirty="0">
+                <a:hlinkClick r:id="rId7"/>
+              </a:rPr>
+              <a:t>Turbofan engine degradation simulation </a:t>
+            </a:r>
+            <a:r>
+              <a:rPr lang="en-US" dirty="0" smtClean="0">
+                <a:hlinkClick r:id="rId7"/>
+              </a:rPr>
+              <a:t>dataset</a:t>
+            </a:r>
+            <a:endParaRPr lang="en-US" dirty="0" smtClean="0"/>
+          </a:p>
+          <a:p>
+            <a:pPr marL="285750" indent="-285750">
+              <a:buFontTx/>
+              <a:buChar char="-"/>
+            </a:pPr>
+            <a:r>
+              <a:rPr lang="en-GB" dirty="0" err="1" smtClean="0"/>
+              <a:t>Femto</a:t>
+            </a:r>
+            <a:r>
+              <a:rPr lang="en-GB" dirty="0" smtClean="0"/>
+              <a:t> </a:t>
+            </a:r>
+            <a:r>
+              <a:rPr lang="en-GB" dirty="0"/>
+              <a:t>bearing dataset</a:t>
+            </a:r>
+            <a:endParaRPr lang="en-GB" dirty="0"/>
+          </a:p>
+        </p:txBody>
+      </p:sp>
+      <p:sp>
+        <p:nvSpPr>
+          <p:cNvPr id="3" name="TextBox 2"/>
+          <p:cNvSpPr txBox="1"/>
+          <p:nvPr/>
+        </p:nvSpPr>
+        <p:spPr>
+          <a:xfrm>
+            <a:off x="7344229" y="4807562"/>
+            <a:ext cx="4279020" cy="646331"/>
+          </a:xfrm>
+          <a:prstGeom prst="rect">
+            <a:avLst/>
+          </a:prstGeom>
+          <a:noFill/>
+        </p:spPr>
+        <p:txBody>
+          <a:bodyPr wrap="square" rtlCol="0">
+            <a:spAutoFit/>
+          </a:bodyPr>
+          <a:lstStyle/>
+          <a:p>
+            <a:r>
+              <a:rPr lang="en-US" dirty="0" smtClean="0"/>
+              <a:t>- explainable </a:t>
+            </a:r>
+            <a:r>
+              <a:rPr lang="en-US" dirty="0"/>
+              <a:t>artificial intelligence (XAI</a:t>
+            </a:r>
+            <a:r>
+              <a:rPr lang="en-US" dirty="0" smtClean="0"/>
+              <a:t>) (domain experts + data scientists)</a:t>
+            </a:r>
+            <a:endParaRPr lang="en-US" dirty="0"/>
           </a:p>
         </p:txBody>
       </p:sp>
@@ -5158,6 +5484,313 @@
         </p:nvSpPr>
         <p:spPr>
           <a:xfrm>
+            <a:off x="0" y="185780"/>
+            <a:ext cx="13541829" cy="581472"/>
+          </a:xfrm>
+        </p:spPr>
+        <p:txBody>
+          <a:bodyPr>
+            <a:normAutofit/>
+          </a:bodyPr>
+          <a:lstStyle/>
+          <a:p>
+            <a:r>
+              <a:rPr lang="en-US" sz="3200" dirty="0">
+                <a:hlinkClick r:id="rId3"/>
+              </a:rPr>
+              <a:t>A Survey of Predictive Maintenance: Systems, Purposes and Approaches</a:t>
+            </a:r>
+            <a:endParaRPr lang="en-GB" sz="3200" dirty="0"/>
+          </a:p>
+        </p:txBody>
+      </p:sp>
+      <p:sp>
+        <p:nvSpPr>
+          <p:cNvPr id="4" name="TextBox 3">
+            <a:extLst>
+              <a:ext uri="{FF2B5EF4-FFF2-40B4-BE49-F238E27FC236}">
+                <a16:creationId xmlns:a16="http://schemas.microsoft.com/office/drawing/2014/main" id="{68BE6D4C-6FAA-B0A8-A39E-505646A96F89}"/>
+              </a:ext>
+            </a:extLst>
+          </p:cNvPr>
+          <p:cNvSpPr txBox="1"/>
+          <p:nvPr/>
+        </p:nvSpPr>
+        <p:spPr>
+          <a:xfrm>
+            <a:off x="-257577" y="6349286"/>
+            <a:ext cx="12449577" cy="369332"/>
+          </a:xfrm>
+          <a:prstGeom prst="rect">
+            <a:avLst/>
+          </a:prstGeom>
+          <a:noFill/>
+        </p:spPr>
+        <p:txBody>
+          <a:bodyPr wrap="square" rtlCol="0">
+            <a:spAutoFit/>
+          </a:bodyPr>
+          <a:lstStyle/>
+          <a:p>
+            <a:pPr algn="ctr"/>
+            <a:r>
+              <a:rPr lang="en-US" dirty="0" smtClean="0"/>
+              <a:t>Electrical Engineering and Systems Science</a:t>
+            </a:r>
+            <a:r>
+              <a:rPr lang="en-GB" dirty="0"/>
+              <a:t> </a:t>
+            </a:r>
+            <a:r>
+              <a:rPr lang="en-GB" dirty="0" smtClean="0"/>
+              <a:t>– </a:t>
+            </a:r>
+            <a:r>
+              <a:rPr lang="en-GB" dirty="0" err="1" smtClean="0"/>
+              <a:t>arXivLabs</a:t>
+            </a:r>
+            <a:r>
+              <a:rPr lang="en-GB" dirty="0" smtClean="0"/>
+              <a:t> – December 2019</a:t>
+            </a:r>
+            <a:endParaRPr lang="en-GB" dirty="0"/>
+          </a:p>
+        </p:txBody>
+      </p:sp>
+      <p:cxnSp>
+        <p:nvCxnSpPr>
+          <p:cNvPr id="6" name="Straight Connector 5">
+            <a:extLst>
+              <a:ext uri="{FF2B5EF4-FFF2-40B4-BE49-F238E27FC236}">
+                <a16:creationId xmlns:a16="http://schemas.microsoft.com/office/drawing/2014/main" id="{DEE16A59-BE4D-F8DF-F4AA-ABB544D9BCF5}"/>
+              </a:ext>
+            </a:extLst>
+          </p:cNvPr>
+          <p:cNvCxnSpPr/>
+          <p:nvPr/>
+        </p:nvCxnSpPr>
+        <p:spPr>
+          <a:xfrm flipV="1">
+            <a:off x="0" y="6317088"/>
+            <a:ext cx="12192000" cy="64396"/>
+          </a:xfrm>
+          <a:prstGeom prst="line">
+            <a:avLst/>
+          </a:prstGeom>
+        </p:spPr>
+        <p:style>
+          <a:lnRef idx="1">
+            <a:schemeClr val="accent1"/>
+          </a:lnRef>
+          <a:fillRef idx="0">
+            <a:schemeClr val="accent1"/>
+          </a:fillRef>
+          <a:effectRef idx="0">
+            <a:schemeClr val="accent1"/>
+          </a:effectRef>
+          <a:fontRef idx="minor">
+            <a:schemeClr val="tx1"/>
+          </a:fontRef>
+        </p:style>
+      </p:cxnSp>
+      <p:sp>
+        <p:nvSpPr>
+          <p:cNvPr id="9" name="TextBox 8"/>
+          <p:cNvSpPr txBox="1"/>
+          <p:nvPr/>
+        </p:nvSpPr>
+        <p:spPr>
+          <a:xfrm>
+            <a:off x="10250079" y="6381484"/>
+            <a:ext cx="1941921" cy="369332"/>
+          </a:xfrm>
+          <a:prstGeom prst="rect">
+            <a:avLst/>
+          </a:prstGeom>
+          <a:noFill/>
+        </p:spPr>
+        <p:txBody>
+          <a:bodyPr wrap="square" rtlCol="0">
+            <a:spAutoFit/>
+          </a:bodyPr>
+          <a:lstStyle/>
+          <a:p>
+            <a:r>
+              <a:rPr lang="en-US" dirty="0" smtClean="0">
+                <a:solidFill>
+                  <a:srgbClr val="FF0000"/>
+                </a:solidFill>
+              </a:rPr>
+              <a:t>Review</a:t>
+            </a:r>
+            <a:r>
+              <a:rPr lang="en-US" dirty="0" smtClean="0"/>
+              <a:t>/ Methods</a:t>
+            </a:r>
+            <a:endParaRPr lang="en-US" dirty="0"/>
+          </a:p>
+        </p:txBody>
+      </p:sp>
+      <p:sp>
+        <p:nvSpPr>
+          <p:cNvPr id="5" name="TextBox 4"/>
+          <p:cNvSpPr txBox="1"/>
+          <p:nvPr/>
+        </p:nvSpPr>
+        <p:spPr>
+          <a:xfrm>
+            <a:off x="377072" y="876693"/>
+            <a:ext cx="5147035" cy="1200329"/>
+          </a:xfrm>
+          <a:prstGeom prst="rect">
+            <a:avLst/>
+          </a:prstGeom>
+          <a:noFill/>
+        </p:spPr>
+        <p:txBody>
+          <a:bodyPr wrap="square" rtlCol="0">
+            <a:spAutoFit/>
+          </a:bodyPr>
+          <a:lstStyle/>
+          <a:p>
+            <a:r>
+              <a:rPr lang="en-US" dirty="0" smtClean="0"/>
+              <a:t>- A transition of maintenance strategies from Reactive Maintenance (restore the equipment after failure occurs) </a:t>
+            </a:r>
+            <a:r>
+              <a:rPr lang="en-US" dirty="0" smtClean="0">
+                <a:sym typeface="Wingdings" panose="05000000000000000000" pitchFamily="2" charset="2"/>
+              </a:rPr>
+              <a:t> Preventive Maintenance (a planned schedule, unnecessary, prevention costs)  </a:t>
+            </a:r>
+            <a:r>
+              <a:rPr lang="en-US" dirty="0" err="1" smtClean="0">
+                <a:sym typeface="Wingdings" panose="05000000000000000000" pitchFamily="2" charset="2"/>
+              </a:rPr>
+              <a:t>PdM</a:t>
+            </a:r>
+            <a:endParaRPr lang="en-US" dirty="0"/>
+          </a:p>
+        </p:txBody>
+      </p:sp>
+      <p:sp>
+        <p:nvSpPr>
+          <p:cNvPr id="7" name="TextBox 6"/>
+          <p:cNvSpPr txBox="1"/>
+          <p:nvPr/>
+        </p:nvSpPr>
+        <p:spPr>
+          <a:xfrm>
+            <a:off x="499621" y="2158738"/>
+            <a:ext cx="4817097" cy="1477328"/>
+          </a:xfrm>
+          <a:prstGeom prst="rect">
+            <a:avLst/>
+          </a:prstGeom>
+          <a:noFill/>
+        </p:spPr>
+        <p:txBody>
+          <a:bodyPr wrap="square" rtlCol="0">
+            <a:spAutoFit/>
+          </a:bodyPr>
+          <a:lstStyle/>
+          <a:p>
+            <a:r>
+              <a:rPr lang="en-US" dirty="0" smtClean="0"/>
+              <a:t>- The limitations of existing surveys:</a:t>
+            </a:r>
+          </a:p>
+          <a:p>
+            <a:pPr marL="342900" indent="-342900">
+              <a:buAutoNum type="arabicParenBoth"/>
+            </a:pPr>
+            <a:r>
+              <a:rPr lang="en-US" dirty="0" smtClean="0"/>
+              <a:t>Focus on equipment specific -&gt; provide a holistic </a:t>
+            </a:r>
+            <a:r>
+              <a:rPr lang="en-US" dirty="0" err="1" smtClean="0"/>
+              <a:t>PdM</a:t>
+            </a:r>
+            <a:r>
+              <a:rPr lang="en-US" dirty="0" smtClean="0"/>
+              <a:t> system. </a:t>
+            </a:r>
+          </a:p>
+          <a:p>
+            <a:pPr marL="342900" indent="-342900">
+              <a:buAutoNum type="arabicParenBoth"/>
+            </a:pPr>
+            <a:r>
+              <a:rPr lang="en-US" dirty="0" smtClean="0"/>
+              <a:t>Lacking mathematical models for </a:t>
+            </a:r>
+            <a:r>
+              <a:rPr lang="en-US" dirty="0" err="1" smtClean="0"/>
+              <a:t>PdM</a:t>
+            </a:r>
+            <a:endParaRPr lang="en-US" dirty="0"/>
+          </a:p>
+          <a:p>
+            <a:pPr marL="342900" indent="-342900">
+              <a:buAutoNum type="arabicParenBoth"/>
+            </a:pPr>
+            <a:r>
+              <a:rPr lang="en-US" dirty="0" smtClean="0"/>
+              <a:t>New DL approaches</a:t>
+            </a:r>
+            <a:endParaRPr lang="en-US" dirty="0"/>
+          </a:p>
+        </p:txBody>
+      </p:sp>
+    </p:spTree>
+    <p:extLst>
+      <p:ext uri="{BB962C8B-B14F-4D97-AF65-F5344CB8AC3E}">
+        <p14:creationId xmlns:p14="http://schemas.microsoft.com/office/powerpoint/2010/main" val="3443838770"/>
+      </p:ext>
+    </p:extLst>
+  </p:cSld>
+  <p:clrMapOvr>
+    <a:masterClrMapping/>
+  </p:clrMapOvr>
+</p:sld>
+</file>
+
+<file path=ppt/slides/slide5.xml><?xml version="1.0" encoding="utf-8"?>
+<p:sld xmlns:a="http://schemas.openxmlformats.org/drawingml/2006/main" xmlns:r="http://schemas.openxmlformats.org/officeDocument/2006/relationships" xmlns:p="http://schemas.openxmlformats.org/presentationml/2006/main">
+  <p:cSld>
+    <p:spTree>
+      <p:nvGrpSpPr>
+        <p:cNvPr id="1" name=""/>
+        <p:cNvGrpSpPr/>
+        <p:nvPr/>
+      </p:nvGrpSpPr>
+      <p:grpSpPr>
+        <a:xfrm>
+          <a:off x="0" y="0"/>
+          <a:ext cx="0" cy="0"/>
+          <a:chOff x="0" y="0"/>
+          <a:chExt cx="0" cy="0"/>
+        </a:xfrm>
+      </p:grpSpPr>
+      <p:sp>
+        <p:nvSpPr>
+          <p:cNvPr id="2" name="Title 1">
+            <a:extLst>
+              <a:ext uri="{FF2B5EF4-FFF2-40B4-BE49-F238E27FC236}">
+                <a16:creationId xmlns:a16="http://schemas.microsoft.com/office/drawing/2014/main" id="{46A74845-DE20-4B2D-31E7-0C3A96D2C54E}"/>
+              </a:ext>
+            </a:extLst>
+          </p:cNvPr>
+          <p:cNvSpPr>
+            <a:spLocks noGrp="1"/>
+          </p:cNvSpPr>
+          <p:nvPr>
+            <p:ph type="title"/>
+          </p:nvPr>
+        </p:nvSpPr>
+        <p:spPr>
+          <a:xfrm>
             <a:off x="489397" y="152261"/>
             <a:ext cx="10773177" cy="581472"/>
           </a:xfrm>
@@ -5265,7 +5898,7 @@
           <p:nvPr/>
         </p:nvPicPr>
         <p:blipFill>
-          <a:blip r:embed="rId4">
+          <a:blip r:embed="rId4" cstate="hqprint">
             <a:extLst>
               <a:ext uri="{28A0092B-C50C-407E-A947-70E740481C1C}">
                 <a14:useLocalDpi xmlns:a14="http://schemas.microsoft.com/office/drawing/2010/main" val="0"/>
@@ -5474,7 +6107,7 @@
 </p:sld>
 </file>
 
-<file path=ppt/slides/slide5.xml><?xml version="1.0" encoding="utf-8"?>
+<file path=ppt/slides/slide6.xml><?xml version="1.0" encoding="utf-8"?>
 <p:sld xmlns:a="http://schemas.openxmlformats.org/drawingml/2006/main" xmlns:r="http://schemas.openxmlformats.org/officeDocument/2006/relationships" xmlns:p="http://schemas.openxmlformats.org/presentationml/2006/main">
   <p:cSld>
     <p:spTree>
@@ -5660,7 +6293,7 @@
 </p:sld>
 </file>
 
-<file path=ppt/slides/slide6.xml><?xml version="1.0" encoding="utf-8"?>
+<file path=ppt/slides/slide7.xml><?xml version="1.0" encoding="utf-8"?>
 <p:sld xmlns:a="http://schemas.openxmlformats.org/drawingml/2006/main" xmlns:r="http://schemas.openxmlformats.org/officeDocument/2006/relationships" xmlns:p="http://schemas.openxmlformats.org/presentationml/2006/main">
   <p:cSld>
     <p:spTree>
@@ -5967,7 +6600,7 @@
 </p:sld>
 </file>
 
-<file path=ppt/slides/slide7.xml><?xml version="1.0" encoding="utf-8"?>
+<file path=ppt/slides/slide8.xml><?xml version="1.0" encoding="utf-8"?>
 <p:sld xmlns:a="http://schemas.openxmlformats.org/drawingml/2006/main" xmlns:r="http://schemas.openxmlformats.org/officeDocument/2006/relationships" xmlns:p="http://schemas.openxmlformats.org/presentationml/2006/main">
   <p:cSld>
     <p:spTree>

</xml_diff>

<commit_message>
[UPDATE] Summarize A Survey of Predictive Maintenance: Systems, Purposes and Approaches
</commit_message>
<xml_diff>
--- a/slides/PredictiveMaintainance_Review.pptx
+++ b/slides/PredictiveMaintainance_Review.pptx
@@ -5394,7 +5394,6 @@
               <a:rPr lang="en-GB" dirty="0"/>
               <a:t>bearing dataset</a:t>
             </a:r>
-            <a:endParaRPr lang="en-GB" dirty="0"/>
           </a:p>
         </p:txBody>
       </p:sp>
@@ -5738,6 +5737,171 @@
             <a:r>
               <a:rPr lang="en-US" dirty="0" smtClean="0"/>
               <a:t>New DL approaches</a:t>
+            </a:r>
+            <a:endParaRPr lang="en-US" dirty="0"/>
+          </a:p>
+        </p:txBody>
+      </p:sp>
+      <p:pic>
+        <p:nvPicPr>
+          <p:cNvPr id="8" name="Picture 7"/>
+          <p:cNvPicPr>
+            <a:picLocks noChangeAspect="1"/>
+          </p:cNvPicPr>
+          <p:nvPr/>
+        </p:nvPicPr>
+        <p:blipFill>
+          <a:blip r:embed="rId4"/>
+          <a:stretch>
+            <a:fillRect/>
+          </a:stretch>
+        </p:blipFill>
+        <p:spPr>
+          <a:xfrm>
+            <a:off x="5524107" y="1097705"/>
+            <a:ext cx="3157980" cy="2182579"/>
+          </a:xfrm>
+          <a:prstGeom prst="rect">
+            <a:avLst/>
+          </a:prstGeom>
+        </p:spPr>
+      </p:pic>
+      <p:pic>
+        <p:nvPicPr>
+          <p:cNvPr id="10" name="Picture 9"/>
+          <p:cNvPicPr>
+            <a:picLocks noChangeAspect="1"/>
+          </p:cNvPicPr>
+          <p:nvPr/>
+        </p:nvPicPr>
+        <p:blipFill>
+          <a:blip r:embed="rId5"/>
+          <a:stretch>
+            <a:fillRect/>
+          </a:stretch>
+        </p:blipFill>
+        <p:spPr>
+          <a:xfrm>
+            <a:off x="9178319" y="1125461"/>
+            <a:ext cx="2397795" cy="2066554"/>
+          </a:xfrm>
+          <a:prstGeom prst="rect">
+            <a:avLst/>
+          </a:prstGeom>
+        </p:spPr>
+      </p:pic>
+      <p:pic>
+        <p:nvPicPr>
+          <p:cNvPr id="11" name="Picture 10"/>
+          <p:cNvPicPr>
+            <a:picLocks noChangeAspect="1"/>
+          </p:cNvPicPr>
+          <p:nvPr/>
+        </p:nvPicPr>
+        <p:blipFill>
+          <a:blip r:embed="rId6"/>
+          <a:stretch>
+            <a:fillRect/>
+          </a:stretch>
+        </p:blipFill>
+        <p:spPr>
+          <a:xfrm>
+            <a:off x="5115715" y="3500682"/>
+            <a:ext cx="2582747" cy="2149040"/>
+          </a:xfrm>
+          <a:prstGeom prst="rect">
+            <a:avLst/>
+          </a:prstGeom>
+        </p:spPr>
+      </p:pic>
+      <p:pic>
+        <p:nvPicPr>
+          <p:cNvPr id="12" name="Picture 11"/>
+          <p:cNvPicPr>
+            <a:picLocks noChangeAspect="1"/>
+          </p:cNvPicPr>
+          <p:nvPr/>
+        </p:nvPicPr>
+        <p:blipFill>
+          <a:blip r:embed="rId7"/>
+          <a:stretch>
+            <a:fillRect/>
+          </a:stretch>
+        </p:blipFill>
+        <p:spPr>
+          <a:xfrm>
+            <a:off x="7921902" y="3338530"/>
+            <a:ext cx="4031285" cy="2860771"/>
+          </a:xfrm>
+          <a:prstGeom prst="rect">
+            <a:avLst/>
+          </a:prstGeom>
+        </p:spPr>
+      </p:pic>
+      <p:pic>
+        <p:nvPicPr>
+          <p:cNvPr id="13" name="Picture 12"/>
+          <p:cNvPicPr>
+            <a:picLocks noChangeAspect="1"/>
+          </p:cNvPicPr>
+          <p:nvPr/>
+        </p:nvPicPr>
+        <p:blipFill>
+          <a:blip r:embed="rId8"/>
+          <a:stretch>
+            <a:fillRect/>
+          </a:stretch>
+        </p:blipFill>
+        <p:spPr>
+          <a:xfrm>
+            <a:off x="499621" y="3604997"/>
+            <a:ext cx="3616309" cy="2176545"/>
+          </a:xfrm>
+          <a:prstGeom prst="rect">
+            <a:avLst/>
+          </a:prstGeom>
+        </p:spPr>
+      </p:pic>
+      <p:sp>
+        <p:nvSpPr>
+          <p:cNvPr id="14" name="Rectangle 13"/>
+          <p:cNvSpPr/>
+          <p:nvPr/>
+        </p:nvSpPr>
+        <p:spPr>
+          <a:xfrm>
+            <a:off x="163253" y="5713701"/>
+            <a:ext cx="6096000" cy="646331"/>
+          </a:xfrm>
+          <a:prstGeom prst="rect">
+            <a:avLst/>
+          </a:prstGeom>
+        </p:spPr>
+        <p:txBody>
+          <a:bodyPr>
+            <a:spAutoFit/>
+          </a:bodyPr>
+          <a:lstStyle/>
+          <a:p>
+            <a:r>
+              <a:rPr lang="en-US" dirty="0">
+                <a:latin typeface="Times New Roman" panose="02020603050405020304" pitchFamily="18" charset="0"/>
+              </a:rPr>
+              <a:t>GAN is firstly utilized as a data augmentation technique to</a:t>
+            </a:r>
+          </a:p>
+          <a:p>
+            <a:r>
+              <a:rPr lang="en-US" dirty="0">
+                <a:latin typeface="Times New Roman" panose="02020603050405020304" pitchFamily="18" charset="0"/>
+              </a:rPr>
+              <a:t>address the class imbalance issue in the field of </a:t>
+            </a:r>
+            <a:r>
+              <a:rPr lang="en-US" dirty="0" err="1">
+                <a:latin typeface="Times New Roman" panose="02020603050405020304" pitchFamily="18" charset="0"/>
+              </a:rPr>
+              <a:t>PdM</a:t>
             </a:r>
             <a:endParaRPr lang="en-US" dirty="0"/>
           </a:p>

</xml_diff>

<commit_message>
[UPDATE] Complete Transformer architectures
</commit_message>
<xml_diff>
--- a/slides/PredictiveMaintainance_Review.pptx
+++ b/slides/PredictiveMaintainance_Review.pptx
@@ -5,7 +5,7 @@
     <p:sldMasterId id="2147483648" r:id="rId1"/>
   </p:sldMasterIdLst>
   <p:notesMasterIdLst>
-    <p:notesMasterId r:id="rId10"/>
+    <p:notesMasterId r:id="rId13"/>
   </p:notesMasterIdLst>
   <p:sldIdLst>
     <p:sldId id="256" r:id="rId2"/>
@@ -13,9 +13,12 @@
     <p:sldId id="264" r:id="rId4"/>
     <p:sldId id="265" r:id="rId5"/>
     <p:sldId id="258" r:id="rId6"/>
-    <p:sldId id="259" r:id="rId7"/>
-    <p:sldId id="262" r:id="rId8"/>
-    <p:sldId id="263" r:id="rId9"/>
+    <p:sldId id="268" r:id="rId7"/>
+    <p:sldId id="269" r:id="rId8"/>
+    <p:sldId id="266" r:id="rId9"/>
+    <p:sldId id="259" r:id="rId10"/>
+    <p:sldId id="262" r:id="rId11"/>
+    <p:sldId id="263" r:id="rId12"/>
   </p:sldIdLst>
   <p:sldSz cx="12192000" cy="6858000"/>
   <p:notesSz cx="6858000" cy="9144000"/>
@@ -204,7 +207,7 @@
           <a:p>
             <a:fld id="{EC7EDE31-B92F-469B-850D-8F4273B434FD}" type="datetimeFigureOut">
               <a:rPr lang="en-GB" smtClean="0"/>
-              <a:t>09/09/2023</a:t>
+              <a:t>10/09/2023</a:t>
             </a:fld>
             <a:endParaRPr lang="en-GB"/>
           </a:p>
@@ -555,6 +558,90 @@
 </p:notes>
 </file>
 
+<file path=ppt/notesSlides/notesSlide10.xml><?xml version="1.0" encoding="utf-8"?>
+<p:notes xmlns:a="http://schemas.openxmlformats.org/drawingml/2006/main" xmlns:r="http://schemas.openxmlformats.org/officeDocument/2006/relationships" xmlns:p="http://schemas.openxmlformats.org/presentationml/2006/main">
+  <p:cSld>
+    <p:spTree>
+      <p:nvGrpSpPr>
+        <p:cNvPr id="1" name=""/>
+        <p:cNvGrpSpPr/>
+        <p:nvPr/>
+      </p:nvGrpSpPr>
+      <p:grpSpPr>
+        <a:xfrm>
+          <a:off x="0" y="0"/>
+          <a:ext cx="0" cy="0"/>
+          <a:chOff x="0" y="0"/>
+          <a:chExt cx="0" cy="0"/>
+        </a:xfrm>
+      </p:grpSpPr>
+      <p:sp>
+        <p:nvSpPr>
+          <p:cNvPr id="2" name="Slide Image Placeholder 1"/>
+          <p:cNvSpPr>
+            <a:spLocks noGrp="1" noRot="1" noChangeAspect="1"/>
+          </p:cNvSpPr>
+          <p:nvPr>
+            <p:ph type="sldImg"/>
+          </p:nvPr>
+        </p:nvSpPr>
+        <p:spPr/>
+      </p:sp>
+      <p:sp>
+        <p:nvSpPr>
+          <p:cNvPr id="3" name="Notes Placeholder 2"/>
+          <p:cNvSpPr>
+            <a:spLocks noGrp="1"/>
+          </p:cNvSpPr>
+          <p:nvPr>
+            <p:ph type="body" idx="1"/>
+          </p:nvPr>
+        </p:nvSpPr>
+        <p:spPr/>
+        <p:txBody>
+          <a:bodyPr/>
+          <a:lstStyle/>
+          <a:p>
+            <a:endParaRPr lang="en-GB" dirty="0"/>
+          </a:p>
+        </p:txBody>
+      </p:sp>
+      <p:sp>
+        <p:nvSpPr>
+          <p:cNvPr id="4" name="Slide Number Placeholder 3"/>
+          <p:cNvSpPr>
+            <a:spLocks noGrp="1"/>
+          </p:cNvSpPr>
+          <p:nvPr>
+            <p:ph type="sldNum" sz="quarter" idx="5"/>
+          </p:nvPr>
+        </p:nvSpPr>
+        <p:spPr/>
+        <p:txBody>
+          <a:bodyPr/>
+          <a:lstStyle/>
+          <a:p>
+            <a:fld id="{33521128-C33F-4416-8772-FAD287CEF415}" type="slidenum">
+              <a:rPr lang="en-GB" smtClean="0"/>
+              <a:t>11</a:t>
+            </a:fld>
+            <a:endParaRPr lang="en-GB"/>
+          </a:p>
+        </p:txBody>
+      </p:sp>
+    </p:spTree>
+    <p:extLst>
+      <p:ext uri="{BB962C8B-B14F-4D97-AF65-F5344CB8AC3E}">
+        <p14:creationId xmlns:p14="http://schemas.microsoft.com/office/powerpoint/2010/main" val="1448995133"/>
+      </p:ext>
+    </p:extLst>
+  </p:cSld>
+  <p:clrMapOvr>
+    <a:masterClrMapping/>
+  </p:clrMapOvr>
+</p:notes>
+</file>
+
 <file path=ppt/notesSlides/notesSlide2.xml><?xml version="1.0" encoding="utf-8"?>
 <p:notes xmlns:a="http://schemas.openxmlformats.org/drawingml/2006/main" xmlns:r="http://schemas.openxmlformats.org/officeDocument/2006/relationships" xmlns:p="http://schemas.openxmlformats.org/presentationml/2006/main">
   <p:cSld>
@@ -881,7 +968,7 @@
     </p:spTree>
     <p:extLst>
       <p:ext uri="{BB962C8B-B14F-4D97-AF65-F5344CB8AC3E}">
-        <p14:creationId xmlns:p14="http://schemas.microsoft.com/office/powerpoint/2010/main" val="31023216"/>
+        <p14:creationId xmlns:p14="http://schemas.microsoft.com/office/powerpoint/2010/main" val="4140063677"/>
       </p:ext>
     </p:extLst>
   </p:cSld>
@@ -965,7 +1052,7 @@
     </p:spTree>
     <p:extLst>
       <p:ext uri="{BB962C8B-B14F-4D97-AF65-F5344CB8AC3E}">
-        <p14:creationId xmlns:p14="http://schemas.microsoft.com/office/powerpoint/2010/main" val="2036626409"/>
+        <p14:creationId xmlns:p14="http://schemas.microsoft.com/office/powerpoint/2010/main" val="1582865170"/>
       </p:ext>
     </p:extLst>
   </p:cSld>
@@ -1049,7 +1136,175 @@
     </p:spTree>
     <p:extLst>
       <p:ext uri="{BB962C8B-B14F-4D97-AF65-F5344CB8AC3E}">
-        <p14:creationId xmlns:p14="http://schemas.microsoft.com/office/powerpoint/2010/main" val="1448995133"/>
+        <p14:creationId xmlns:p14="http://schemas.microsoft.com/office/powerpoint/2010/main" val="4070572343"/>
+      </p:ext>
+    </p:extLst>
+  </p:cSld>
+  <p:clrMapOvr>
+    <a:masterClrMapping/>
+  </p:clrMapOvr>
+</p:notes>
+</file>
+
+<file path=ppt/notesSlides/notesSlide8.xml><?xml version="1.0" encoding="utf-8"?>
+<p:notes xmlns:a="http://schemas.openxmlformats.org/drawingml/2006/main" xmlns:r="http://schemas.openxmlformats.org/officeDocument/2006/relationships" xmlns:p="http://schemas.openxmlformats.org/presentationml/2006/main">
+  <p:cSld>
+    <p:spTree>
+      <p:nvGrpSpPr>
+        <p:cNvPr id="1" name=""/>
+        <p:cNvGrpSpPr/>
+        <p:nvPr/>
+      </p:nvGrpSpPr>
+      <p:grpSpPr>
+        <a:xfrm>
+          <a:off x="0" y="0"/>
+          <a:ext cx="0" cy="0"/>
+          <a:chOff x="0" y="0"/>
+          <a:chExt cx="0" cy="0"/>
+        </a:xfrm>
+      </p:grpSpPr>
+      <p:sp>
+        <p:nvSpPr>
+          <p:cNvPr id="2" name="Slide Image Placeholder 1"/>
+          <p:cNvSpPr>
+            <a:spLocks noGrp="1" noRot="1" noChangeAspect="1"/>
+          </p:cNvSpPr>
+          <p:nvPr>
+            <p:ph type="sldImg"/>
+          </p:nvPr>
+        </p:nvSpPr>
+        <p:spPr/>
+      </p:sp>
+      <p:sp>
+        <p:nvSpPr>
+          <p:cNvPr id="3" name="Notes Placeholder 2"/>
+          <p:cNvSpPr>
+            <a:spLocks noGrp="1"/>
+          </p:cNvSpPr>
+          <p:nvPr>
+            <p:ph type="body" idx="1"/>
+          </p:nvPr>
+        </p:nvSpPr>
+        <p:spPr/>
+        <p:txBody>
+          <a:bodyPr/>
+          <a:lstStyle/>
+          <a:p>
+            <a:endParaRPr lang="en-GB" dirty="0"/>
+          </a:p>
+        </p:txBody>
+      </p:sp>
+      <p:sp>
+        <p:nvSpPr>
+          <p:cNvPr id="4" name="Slide Number Placeholder 3"/>
+          <p:cNvSpPr>
+            <a:spLocks noGrp="1"/>
+          </p:cNvSpPr>
+          <p:nvPr>
+            <p:ph type="sldNum" sz="quarter" idx="5"/>
+          </p:nvPr>
+        </p:nvSpPr>
+        <p:spPr/>
+        <p:txBody>
+          <a:bodyPr/>
+          <a:lstStyle/>
+          <a:p>
+            <a:fld id="{33521128-C33F-4416-8772-FAD287CEF415}" type="slidenum">
+              <a:rPr lang="en-GB" smtClean="0"/>
+              <a:t>9</a:t>
+            </a:fld>
+            <a:endParaRPr lang="en-GB"/>
+          </a:p>
+        </p:txBody>
+      </p:sp>
+    </p:spTree>
+    <p:extLst>
+      <p:ext uri="{BB962C8B-B14F-4D97-AF65-F5344CB8AC3E}">
+        <p14:creationId xmlns:p14="http://schemas.microsoft.com/office/powerpoint/2010/main" val="31023216"/>
+      </p:ext>
+    </p:extLst>
+  </p:cSld>
+  <p:clrMapOvr>
+    <a:masterClrMapping/>
+  </p:clrMapOvr>
+</p:notes>
+</file>
+
+<file path=ppt/notesSlides/notesSlide9.xml><?xml version="1.0" encoding="utf-8"?>
+<p:notes xmlns:a="http://schemas.openxmlformats.org/drawingml/2006/main" xmlns:r="http://schemas.openxmlformats.org/officeDocument/2006/relationships" xmlns:p="http://schemas.openxmlformats.org/presentationml/2006/main">
+  <p:cSld>
+    <p:spTree>
+      <p:nvGrpSpPr>
+        <p:cNvPr id="1" name=""/>
+        <p:cNvGrpSpPr/>
+        <p:nvPr/>
+      </p:nvGrpSpPr>
+      <p:grpSpPr>
+        <a:xfrm>
+          <a:off x="0" y="0"/>
+          <a:ext cx="0" cy="0"/>
+          <a:chOff x="0" y="0"/>
+          <a:chExt cx="0" cy="0"/>
+        </a:xfrm>
+      </p:grpSpPr>
+      <p:sp>
+        <p:nvSpPr>
+          <p:cNvPr id="2" name="Slide Image Placeholder 1"/>
+          <p:cNvSpPr>
+            <a:spLocks noGrp="1" noRot="1" noChangeAspect="1"/>
+          </p:cNvSpPr>
+          <p:nvPr>
+            <p:ph type="sldImg"/>
+          </p:nvPr>
+        </p:nvSpPr>
+        <p:spPr/>
+      </p:sp>
+      <p:sp>
+        <p:nvSpPr>
+          <p:cNvPr id="3" name="Notes Placeholder 2"/>
+          <p:cNvSpPr>
+            <a:spLocks noGrp="1"/>
+          </p:cNvSpPr>
+          <p:nvPr>
+            <p:ph type="body" idx="1"/>
+          </p:nvPr>
+        </p:nvSpPr>
+        <p:spPr/>
+        <p:txBody>
+          <a:bodyPr/>
+          <a:lstStyle/>
+          <a:p>
+            <a:endParaRPr lang="en-GB" dirty="0"/>
+          </a:p>
+        </p:txBody>
+      </p:sp>
+      <p:sp>
+        <p:nvSpPr>
+          <p:cNvPr id="4" name="Slide Number Placeholder 3"/>
+          <p:cNvSpPr>
+            <a:spLocks noGrp="1"/>
+          </p:cNvSpPr>
+          <p:nvPr>
+            <p:ph type="sldNum" sz="quarter" idx="5"/>
+          </p:nvPr>
+        </p:nvSpPr>
+        <p:spPr/>
+        <p:txBody>
+          <a:bodyPr/>
+          <a:lstStyle/>
+          <a:p>
+            <a:fld id="{33521128-C33F-4416-8772-FAD287CEF415}" type="slidenum">
+              <a:rPr lang="en-GB" smtClean="0"/>
+              <a:t>10</a:t>
+            </a:fld>
+            <a:endParaRPr lang="en-GB"/>
+          </a:p>
+        </p:txBody>
+      </p:sp>
+    </p:spTree>
+    <p:extLst>
+      <p:ext uri="{BB962C8B-B14F-4D97-AF65-F5344CB8AC3E}">
+        <p14:creationId xmlns:p14="http://schemas.microsoft.com/office/powerpoint/2010/main" val="2036626409"/>
       </p:ext>
     </p:extLst>
   </p:cSld>
@@ -1206,7 +1461,7 @@
           <a:p>
             <a:fld id="{008350BF-9569-438D-850F-FAFC28696C8F}" type="datetimeFigureOut">
               <a:rPr lang="en-GB" smtClean="0"/>
-              <a:t>09/09/2023</a:t>
+              <a:t>10/09/2023</a:t>
             </a:fld>
             <a:endParaRPr lang="en-GB"/>
           </a:p>
@@ -1404,7 +1659,7 @@
           <a:p>
             <a:fld id="{008350BF-9569-438D-850F-FAFC28696C8F}" type="datetimeFigureOut">
               <a:rPr lang="en-GB" smtClean="0"/>
-              <a:t>09/09/2023</a:t>
+              <a:t>10/09/2023</a:t>
             </a:fld>
             <a:endParaRPr lang="en-GB"/>
           </a:p>
@@ -1612,7 +1867,7 @@
           <a:p>
             <a:fld id="{008350BF-9569-438D-850F-FAFC28696C8F}" type="datetimeFigureOut">
               <a:rPr lang="en-GB" smtClean="0"/>
-              <a:t>09/09/2023</a:t>
+              <a:t>10/09/2023</a:t>
             </a:fld>
             <a:endParaRPr lang="en-GB"/>
           </a:p>
@@ -1810,7 +2065,7 @@
           <a:p>
             <a:fld id="{008350BF-9569-438D-850F-FAFC28696C8F}" type="datetimeFigureOut">
               <a:rPr lang="en-GB" smtClean="0"/>
-              <a:t>09/09/2023</a:t>
+              <a:t>10/09/2023</a:t>
             </a:fld>
             <a:endParaRPr lang="en-GB"/>
           </a:p>
@@ -2085,7 +2340,7 @@
           <a:p>
             <a:fld id="{008350BF-9569-438D-850F-FAFC28696C8F}" type="datetimeFigureOut">
               <a:rPr lang="en-GB" smtClean="0"/>
-              <a:t>09/09/2023</a:t>
+              <a:t>10/09/2023</a:t>
             </a:fld>
             <a:endParaRPr lang="en-GB"/>
           </a:p>
@@ -2350,7 +2605,7 @@
           <a:p>
             <a:fld id="{008350BF-9569-438D-850F-FAFC28696C8F}" type="datetimeFigureOut">
               <a:rPr lang="en-GB" smtClean="0"/>
-              <a:t>09/09/2023</a:t>
+              <a:t>10/09/2023</a:t>
             </a:fld>
             <a:endParaRPr lang="en-GB"/>
           </a:p>
@@ -2762,7 +3017,7 @@
           <a:p>
             <a:fld id="{008350BF-9569-438D-850F-FAFC28696C8F}" type="datetimeFigureOut">
               <a:rPr lang="en-GB" smtClean="0"/>
-              <a:t>09/09/2023</a:t>
+              <a:t>10/09/2023</a:t>
             </a:fld>
             <a:endParaRPr lang="en-GB"/>
           </a:p>
@@ -2903,7 +3158,7 @@
           <a:p>
             <a:fld id="{008350BF-9569-438D-850F-FAFC28696C8F}" type="datetimeFigureOut">
               <a:rPr lang="en-GB" smtClean="0"/>
-              <a:t>09/09/2023</a:t>
+              <a:t>10/09/2023</a:t>
             </a:fld>
             <a:endParaRPr lang="en-GB"/>
           </a:p>
@@ -3016,7 +3271,7 @@
           <a:p>
             <a:fld id="{008350BF-9569-438D-850F-FAFC28696C8F}" type="datetimeFigureOut">
               <a:rPr lang="en-GB" smtClean="0"/>
-              <a:t>09/09/2023</a:t>
+              <a:t>10/09/2023</a:t>
             </a:fld>
             <a:endParaRPr lang="en-GB"/>
           </a:p>
@@ -3327,7 +3582,7 @@
           <a:p>
             <a:fld id="{008350BF-9569-438D-850F-FAFC28696C8F}" type="datetimeFigureOut">
               <a:rPr lang="en-GB" smtClean="0"/>
-              <a:t>09/09/2023</a:t>
+              <a:t>10/09/2023</a:t>
             </a:fld>
             <a:endParaRPr lang="en-GB"/>
           </a:p>
@@ -3615,7 +3870,7 @@
           <a:p>
             <a:fld id="{008350BF-9569-438D-850F-FAFC28696C8F}" type="datetimeFigureOut">
               <a:rPr lang="en-GB" smtClean="0"/>
-              <a:t>09/09/2023</a:t>
+              <a:t>10/09/2023</a:t>
             </a:fld>
             <a:endParaRPr lang="en-GB"/>
           </a:p>
@@ -3856,7 +4111,7 @@
           <a:p>
             <a:fld id="{008350BF-9569-438D-850F-FAFC28696C8F}" type="datetimeFigureOut">
               <a:rPr lang="en-GB" smtClean="0"/>
-              <a:t>09/09/2023</a:t>
+              <a:t>10/09/2023</a:t>
             </a:fld>
             <a:endParaRPr lang="en-GB"/>
           </a:p>
@@ -4342,6 +4597,561 @@
 </p:sld>
 </file>
 
+<file path=ppt/slides/slide10.xml><?xml version="1.0" encoding="utf-8"?>
+<p:sld xmlns:a="http://schemas.openxmlformats.org/drawingml/2006/main" xmlns:r="http://schemas.openxmlformats.org/officeDocument/2006/relationships" xmlns:p="http://schemas.openxmlformats.org/presentationml/2006/main">
+  <p:cSld>
+    <p:spTree>
+      <p:nvGrpSpPr>
+        <p:cNvPr id="1" name=""/>
+        <p:cNvGrpSpPr/>
+        <p:nvPr/>
+      </p:nvGrpSpPr>
+      <p:grpSpPr>
+        <a:xfrm>
+          <a:off x="0" y="0"/>
+          <a:ext cx="0" cy="0"/>
+          <a:chOff x="0" y="0"/>
+          <a:chExt cx="0" cy="0"/>
+        </a:xfrm>
+      </p:grpSpPr>
+      <p:sp>
+        <p:nvSpPr>
+          <p:cNvPr id="2" name="Title 1">
+            <a:extLst>
+              <a:ext uri="{FF2B5EF4-FFF2-40B4-BE49-F238E27FC236}">
+                <a16:creationId xmlns:a16="http://schemas.microsoft.com/office/drawing/2014/main" id="{46A74845-DE20-4B2D-31E7-0C3A96D2C54E}"/>
+              </a:ext>
+            </a:extLst>
+          </p:cNvPr>
+          <p:cNvSpPr>
+            <a:spLocks noGrp="1"/>
+          </p:cNvSpPr>
+          <p:nvPr>
+            <p:ph type="title"/>
+          </p:nvPr>
+        </p:nvSpPr>
+        <p:spPr>
+          <a:xfrm>
+            <a:off x="1" y="152261"/>
+            <a:ext cx="12192000" cy="581472"/>
+          </a:xfrm>
+        </p:spPr>
+        <p:txBody>
+          <a:bodyPr>
+            <a:normAutofit/>
+          </a:bodyPr>
+          <a:lstStyle/>
+          <a:p>
+            <a:pPr algn="ctr"/>
+            <a:r>
+              <a:rPr lang="en-GB" sz="3200" dirty="0" err="1"/>
+              <a:t>TSMixer</a:t>
+            </a:r>
+            <a:r>
+              <a:rPr lang="en-GB" sz="3200" dirty="0"/>
+              <a:t>: An All-MLP Architecture for Time Series Fore casting</a:t>
+            </a:r>
+          </a:p>
+        </p:txBody>
+      </p:sp>
+      <p:sp>
+        <p:nvSpPr>
+          <p:cNvPr id="4" name="TextBox 3">
+            <a:extLst>
+              <a:ext uri="{FF2B5EF4-FFF2-40B4-BE49-F238E27FC236}">
+                <a16:creationId xmlns:a16="http://schemas.microsoft.com/office/drawing/2014/main" id="{68BE6D4C-6FAA-B0A8-A39E-505646A96F89}"/>
+              </a:ext>
+            </a:extLst>
+          </p:cNvPr>
+          <p:cNvSpPr txBox="1"/>
+          <p:nvPr/>
+        </p:nvSpPr>
+        <p:spPr>
+          <a:xfrm>
+            <a:off x="-257577" y="6349286"/>
+            <a:ext cx="12449577" cy="369332"/>
+          </a:xfrm>
+          <a:prstGeom prst="rect">
+            <a:avLst/>
+          </a:prstGeom>
+          <a:noFill/>
+        </p:spPr>
+        <p:txBody>
+          <a:bodyPr wrap="square" rtlCol="0">
+            <a:spAutoFit/>
+          </a:bodyPr>
+          <a:lstStyle/>
+          <a:p>
+            <a:pPr algn="ctr"/>
+            <a:r>
+              <a:rPr lang="en-GB" dirty="0" err="1"/>
+              <a:t>arXiv</a:t>
+            </a:r>
+            <a:r>
+              <a:rPr lang="en-GB" dirty="0"/>
+              <a:t> – CS| ML – September 2023</a:t>
+            </a:r>
+          </a:p>
+        </p:txBody>
+      </p:sp>
+      <p:cxnSp>
+        <p:nvCxnSpPr>
+          <p:cNvPr id="6" name="Straight Connector 5">
+            <a:extLst>
+              <a:ext uri="{FF2B5EF4-FFF2-40B4-BE49-F238E27FC236}">
+                <a16:creationId xmlns:a16="http://schemas.microsoft.com/office/drawing/2014/main" id="{DEE16A59-BE4D-F8DF-F4AA-ABB544D9BCF5}"/>
+              </a:ext>
+            </a:extLst>
+          </p:cNvPr>
+          <p:cNvCxnSpPr/>
+          <p:nvPr/>
+        </p:nvCxnSpPr>
+        <p:spPr>
+          <a:xfrm flipV="1">
+            <a:off x="0" y="6317088"/>
+            <a:ext cx="12192000" cy="64396"/>
+          </a:xfrm>
+          <a:prstGeom prst="line">
+            <a:avLst/>
+          </a:prstGeom>
+        </p:spPr>
+        <p:style>
+          <a:lnRef idx="1">
+            <a:schemeClr val="accent1"/>
+          </a:lnRef>
+          <a:fillRef idx="0">
+            <a:schemeClr val="accent1"/>
+          </a:fillRef>
+          <a:effectRef idx="0">
+            <a:schemeClr val="accent1"/>
+          </a:effectRef>
+          <a:fontRef idx="minor">
+            <a:schemeClr val="tx1"/>
+          </a:fontRef>
+        </p:style>
+      </p:cxnSp>
+      <p:pic>
+        <p:nvPicPr>
+          <p:cNvPr id="7" name="Picture 6">
+            <a:extLst>
+              <a:ext uri="{FF2B5EF4-FFF2-40B4-BE49-F238E27FC236}">
+                <a16:creationId xmlns:a16="http://schemas.microsoft.com/office/drawing/2014/main" id="{BAA89558-26CC-3AB8-BAD5-32E34B77F5AA}"/>
+              </a:ext>
+            </a:extLst>
+          </p:cNvPr>
+          <p:cNvPicPr>
+            <a:picLocks noChangeAspect="1"/>
+          </p:cNvPicPr>
+          <p:nvPr/>
+        </p:nvPicPr>
+        <p:blipFill>
+          <a:blip r:embed="rId3"/>
+          <a:stretch>
+            <a:fillRect/>
+          </a:stretch>
+        </p:blipFill>
+        <p:spPr>
+          <a:xfrm>
+            <a:off x="6213979" y="993553"/>
+            <a:ext cx="5533778" cy="4771984"/>
+          </a:xfrm>
+          <a:prstGeom prst="rect">
+            <a:avLst/>
+          </a:prstGeom>
+        </p:spPr>
+      </p:pic>
+      <p:sp>
+        <p:nvSpPr>
+          <p:cNvPr id="8" name="TextBox 7">
+            <a:extLst>
+              <a:ext uri="{FF2B5EF4-FFF2-40B4-BE49-F238E27FC236}">
+                <a16:creationId xmlns:a16="http://schemas.microsoft.com/office/drawing/2014/main" id="{563D71C0-E3A4-A29D-CCCD-0C016BDC7E45}"/>
+              </a:ext>
+            </a:extLst>
+          </p:cNvPr>
+          <p:cNvSpPr txBox="1"/>
+          <p:nvPr/>
+        </p:nvSpPr>
+        <p:spPr>
+          <a:xfrm>
+            <a:off x="244699" y="662068"/>
+            <a:ext cx="5525036" cy="923330"/>
+          </a:xfrm>
+          <a:prstGeom prst="rect">
+            <a:avLst/>
+          </a:prstGeom>
+          <a:noFill/>
+        </p:spPr>
+        <p:txBody>
+          <a:bodyPr wrap="square" rtlCol="0">
+            <a:spAutoFit/>
+          </a:bodyPr>
+          <a:lstStyle/>
+          <a:p>
+            <a:pPr marL="285750" indent="-285750">
+              <a:buFont typeface="Arial" panose="020B0604020202020204" pitchFamily="34" charset="0"/>
+              <a:buChar char="•"/>
+            </a:pPr>
+            <a:r>
+              <a:rPr lang="en-GB" dirty="0"/>
+              <a:t>Google Cloud AI Research</a:t>
+            </a:r>
+          </a:p>
+          <a:p>
+            <a:pPr marL="285750" indent="-285750">
+              <a:buFont typeface="Arial" panose="020B0604020202020204" pitchFamily="34" charset="0"/>
+              <a:buChar char="•"/>
+            </a:pPr>
+            <a:r>
+              <a:rPr lang="en-GB" dirty="0">
+                <a:hlinkClick r:id="rId4"/>
+              </a:rPr>
+              <a:t>https://github.com/google-research/google-research/tree/master/tsmixer</a:t>
+            </a:r>
+            <a:endParaRPr lang="en-GB" dirty="0"/>
+          </a:p>
+        </p:txBody>
+      </p:sp>
+      <p:pic>
+        <p:nvPicPr>
+          <p:cNvPr id="12" name="Picture 11">
+            <a:extLst>
+              <a:ext uri="{FF2B5EF4-FFF2-40B4-BE49-F238E27FC236}">
+                <a16:creationId xmlns:a16="http://schemas.microsoft.com/office/drawing/2014/main" id="{E0B6134E-9D77-636E-86AC-5E073246680F}"/>
+              </a:ext>
+            </a:extLst>
+          </p:cNvPr>
+          <p:cNvPicPr>
+            <a:picLocks noChangeAspect="1"/>
+          </p:cNvPicPr>
+          <p:nvPr/>
+        </p:nvPicPr>
+        <p:blipFill>
+          <a:blip r:embed="rId5"/>
+          <a:stretch>
+            <a:fillRect/>
+          </a:stretch>
+        </p:blipFill>
+        <p:spPr>
+          <a:xfrm>
+            <a:off x="470822" y="1955271"/>
+            <a:ext cx="5298913" cy="2848549"/>
+          </a:xfrm>
+          <a:prstGeom prst="rect">
+            <a:avLst/>
+          </a:prstGeom>
+        </p:spPr>
+      </p:pic>
+      <p:sp>
+        <p:nvSpPr>
+          <p:cNvPr id="13" name="TextBox 12">
+            <a:extLst>
+              <a:ext uri="{FF2B5EF4-FFF2-40B4-BE49-F238E27FC236}">
+                <a16:creationId xmlns:a16="http://schemas.microsoft.com/office/drawing/2014/main" id="{63FAF0F6-7396-6519-4D16-F00F58B409A8}"/>
+              </a:ext>
+            </a:extLst>
+          </p:cNvPr>
+          <p:cNvSpPr txBox="1"/>
+          <p:nvPr/>
+        </p:nvSpPr>
+        <p:spPr>
+          <a:xfrm>
+            <a:off x="470822" y="4700789"/>
+            <a:ext cx="4983381" cy="646331"/>
+          </a:xfrm>
+          <a:prstGeom prst="rect">
+            <a:avLst/>
+          </a:prstGeom>
+          <a:noFill/>
+        </p:spPr>
+        <p:txBody>
+          <a:bodyPr wrap="square" rtlCol="0">
+            <a:spAutoFit/>
+          </a:bodyPr>
+          <a:lstStyle/>
+          <a:p>
+            <a:pPr marL="285750" indent="-285750">
+              <a:buFont typeface="Arial" panose="020B0604020202020204" pitchFamily="34" charset="0"/>
+              <a:buChar char="•"/>
+            </a:pPr>
+            <a:r>
+              <a:rPr lang="en-GB" dirty="0"/>
+              <a:t>Previous DL tend to overfit the data</a:t>
+            </a:r>
+          </a:p>
+          <a:p>
+            <a:pPr marL="285750" indent="-285750">
+              <a:buFont typeface="Arial" panose="020B0604020202020204" pitchFamily="34" charset="0"/>
+              <a:buChar char="•"/>
+            </a:pPr>
+            <a:r>
+              <a:rPr lang="en-GB" dirty="0"/>
+              <a:t>“time-step-dependent” &gt;&lt; “data-dependent”</a:t>
+            </a:r>
+          </a:p>
+        </p:txBody>
+      </p:sp>
+      <p:sp>
+        <p:nvSpPr>
+          <p:cNvPr id="9" name="Rectangle 8"/>
+          <p:cNvSpPr/>
+          <p:nvPr/>
+        </p:nvSpPr>
+        <p:spPr>
+          <a:xfrm>
+            <a:off x="10439728" y="6332634"/>
+            <a:ext cx="1842620" cy="369332"/>
+          </a:xfrm>
+          <a:prstGeom prst="rect">
+            <a:avLst/>
+          </a:prstGeom>
+        </p:spPr>
+        <p:txBody>
+          <a:bodyPr wrap="none">
+            <a:spAutoFit/>
+          </a:bodyPr>
+          <a:lstStyle/>
+          <a:p>
+            <a:r>
+              <a:rPr lang="en-US" dirty="0"/>
+              <a:t>Review/ </a:t>
+            </a:r>
+            <a:r>
+              <a:rPr lang="en-US" dirty="0">
+                <a:solidFill>
+                  <a:srgbClr val="FF0000"/>
+                </a:solidFill>
+              </a:rPr>
+              <a:t>Methods</a:t>
+            </a:r>
+          </a:p>
+        </p:txBody>
+      </p:sp>
+    </p:spTree>
+    <p:extLst>
+      <p:ext uri="{BB962C8B-B14F-4D97-AF65-F5344CB8AC3E}">
+        <p14:creationId xmlns:p14="http://schemas.microsoft.com/office/powerpoint/2010/main" val="40973893"/>
+      </p:ext>
+    </p:extLst>
+  </p:cSld>
+  <p:clrMapOvr>
+    <a:masterClrMapping/>
+  </p:clrMapOvr>
+</p:sld>
+</file>
+
+<file path=ppt/slides/slide11.xml><?xml version="1.0" encoding="utf-8"?>
+<p:sld xmlns:a="http://schemas.openxmlformats.org/drawingml/2006/main" xmlns:r="http://schemas.openxmlformats.org/officeDocument/2006/relationships" xmlns:p="http://schemas.openxmlformats.org/presentationml/2006/main">
+  <p:cSld>
+    <p:spTree>
+      <p:nvGrpSpPr>
+        <p:cNvPr id="1" name=""/>
+        <p:cNvGrpSpPr/>
+        <p:nvPr/>
+      </p:nvGrpSpPr>
+      <p:grpSpPr>
+        <a:xfrm>
+          <a:off x="0" y="0"/>
+          <a:ext cx="0" cy="0"/>
+          <a:chOff x="0" y="0"/>
+          <a:chExt cx="0" cy="0"/>
+        </a:xfrm>
+      </p:grpSpPr>
+      <p:sp>
+        <p:nvSpPr>
+          <p:cNvPr id="2" name="Title 1">
+            <a:extLst>
+              <a:ext uri="{FF2B5EF4-FFF2-40B4-BE49-F238E27FC236}">
+                <a16:creationId xmlns:a16="http://schemas.microsoft.com/office/drawing/2014/main" id="{46A74845-DE20-4B2D-31E7-0C3A96D2C54E}"/>
+              </a:ext>
+            </a:extLst>
+          </p:cNvPr>
+          <p:cNvSpPr>
+            <a:spLocks noGrp="1"/>
+          </p:cNvSpPr>
+          <p:nvPr>
+            <p:ph type="title"/>
+          </p:nvPr>
+        </p:nvSpPr>
+        <p:spPr>
+          <a:xfrm>
+            <a:off x="1" y="152261"/>
+            <a:ext cx="12192000" cy="581472"/>
+          </a:xfrm>
+        </p:spPr>
+        <p:txBody>
+          <a:bodyPr>
+            <a:normAutofit/>
+          </a:bodyPr>
+          <a:lstStyle/>
+          <a:p>
+            <a:pPr algn="ctr"/>
+            <a:r>
+              <a:rPr lang="en-GB" sz="3200" dirty="0"/>
+              <a:t>MLP-Mixer: An all-MLP Architecture for Vision</a:t>
+            </a:r>
+          </a:p>
+        </p:txBody>
+      </p:sp>
+      <p:sp>
+        <p:nvSpPr>
+          <p:cNvPr id="4" name="TextBox 3">
+            <a:extLst>
+              <a:ext uri="{FF2B5EF4-FFF2-40B4-BE49-F238E27FC236}">
+                <a16:creationId xmlns:a16="http://schemas.microsoft.com/office/drawing/2014/main" id="{68BE6D4C-6FAA-B0A8-A39E-505646A96F89}"/>
+              </a:ext>
+            </a:extLst>
+          </p:cNvPr>
+          <p:cNvSpPr txBox="1"/>
+          <p:nvPr/>
+        </p:nvSpPr>
+        <p:spPr>
+          <a:xfrm>
+            <a:off x="-257577" y="6349286"/>
+            <a:ext cx="12449577" cy="369332"/>
+          </a:xfrm>
+          <a:prstGeom prst="rect">
+            <a:avLst/>
+          </a:prstGeom>
+          <a:noFill/>
+        </p:spPr>
+        <p:txBody>
+          <a:bodyPr wrap="square" rtlCol="0">
+            <a:spAutoFit/>
+          </a:bodyPr>
+          <a:lstStyle/>
+          <a:p>
+            <a:pPr algn="ctr"/>
+            <a:r>
+              <a:rPr lang="en-GB" dirty="0"/>
+              <a:t> Advances in Neural Information Processing Systems 34 (</a:t>
+            </a:r>
+            <a:r>
+              <a:rPr lang="en-GB" dirty="0" err="1"/>
+              <a:t>NeurIPS</a:t>
+            </a:r>
+            <a:r>
+              <a:rPr lang="en-GB" dirty="0"/>
+              <a:t> 2021)</a:t>
+            </a:r>
+          </a:p>
+        </p:txBody>
+      </p:sp>
+      <p:cxnSp>
+        <p:nvCxnSpPr>
+          <p:cNvPr id="6" name="Straight Connector 5">
+            <a:extLst>
+              <a:ext uri="{FF2B5EF4-FFF2-40B4-BE49-F238E27FC236}">
+                <a16:creationId xmlns:a16="http://schemas.microsoft.com/office/drawing/2014/main" id="{DEE16A59-BE4D-F8DF-F4AA-ABB544D9BCF5}"/>
+              </a:ext>
+            </a:extLst>
+          </p:cNvPr>
+          <p:cNvCxnSpPr/>
+          <p:nvPr/>
+        </p:nvCxnSpPr>
+        <p:spPr>
+          <a:xfrm flipV="1">
+            <a:off x="0" y="6317088"/>
+            <a:ext cx="12192000" cy="64396"/>
+          </a:xfrm>
+          <a:prstGeom prst="line">
+            <a:avLst/>
+          </a:prstGeom>
+        </p:spPr>
+        <p:style>
+          <a:lnRef idx="1">
+            <a:schemeClr val="accent1"/>
+          </a:lnRef>
+          <a:fillRef idx="0">
+            <a:schemeClr val="accent1"/>
+          </a:fillRef>
+          <a:effectRef idx="0">
+            <a:schemeClr val="accent1"/>
+          </a:effectRef>
+          <a:fontRef idx="minor">
+            <a:schemeClr val="tx1"/>
+          </a:fontRef>
+        </p:style>
+      </p:cxnSp>
+      <p:pic>
+        <p:nvPicPr>
+          <p:cNvPr id="5" name="Picture 4">
+            <a:extLst>
+              <a:ext uri="{FF2B5EF4-FFF2-40B4-BE49-F238E27FC236}">
+                <a16:creationId xmlns:a16="http://schemas.microsoft.com/office/drawing/2014/main" id="{72F258CF-60EB-4D17-9A53-FB61178CA968}"/>
+              </a:ext>
+            </a:extLst>
+          </p:cNvPr>
+          <p:cNvPicPr>
+            <a:picLocks noChangeAspect="1"/>
+          </p:cNvPicPr>
+          <p:nvPr/>
+        </p:nvPicPr>
+        <p:blipFill>
+          <a:blip r:embed="rId3"/>
+          <a:stretch>
+            <a:fillRect/>
+          </a:stretch>
+        </p:blipFill>
+        <p:spPr>
+          <a:xfrm>
+            <a:off x="2017093" y="1042654"/>
+            <a:ext cx="8869013" cy="4772691"/>
+          </a:xfrm>
+          <a:prstGeom prst="rect">
+            <a:avLst/>
+          </a:prstGeom>
+        </p:spPr>
+      </p:pic>
+      <p:sp>
+        <p:nvSpPr>
+          <p:cNvPr id="7" name="Rectangle 6"/>
+          <p:cNvSpPr/>
+          <p:nvPr/>
+        </p:nvSpPr>
+        <p:spPr>
+          <a:xfrm>
+            <a:off x="10439728" y="6332634"/>
+            <a:ext cx="1842620" cy="369332"/>
+          </a:xfrm>
+          <a:prstGeom prst="rect">
+            <a:avLst/>
+          </a:prstGeom>
+        </p:spPr>
+        <p:txBody>
+          <a:bodyPr wrap="none">
+            <a:spAutoFit/>
+          </a:bodyPr>
+          <a:lstStyle/>
+          <a:p>
+            <a:r>
+              <a:rPr lang="en-US" dirty="0"/>
+              <a:t>Review/ </a:t>
+            </a:r>
+            <a:r>
+              <a:rPr lang="en-US" dirty="0">
+                <a:solidFill>
+                  <a:srgbClr val="FF0000"/>
+                </a:solidFill>
+              </a:rPr>
+              <a:t>Methods</a:t>
+            </a:r>
+          </a:p>
+        </p:txBody>
+      </p:sp>
+    </p:spTree>
+    <p:extLst>
+      <p:ext uri="{BB962C8B-B14F-4D97-AF65-F5344CB8AC3E}">
+        <p14:creationId xmlns:p14="http://schemas.microsoft.com/office/powerpoint/2010/main" val="81168443"/>
+      </p:ext>
+    </p:extLst>
+  </p:cSld>
+  <p:clrMapOvr>
+    <a:masterClrMapping/>
+  </p:clrMapOvr>
+</p:sld>
+</file>
+
 <file path=ppt/slides/slide2.xml><?xml version="1.0" encoding="utf-8"?>
 <p:sld xmlns:a="http://schemas.openxmlformats.org/drawingml/2006/main" xmlns:r="http://schemas.openxmlformats.org/officeDocument/2006/relationships" xmlns:p="http://schemas.openxmlformats.org/presentationml/2006/main">
   <p:cSld>
@@ -5955,8 +6765,8 @@
         </p:nvSpPr>
         <p:spPr>
           <a:xfrm>
-            <a:off x="489397" y="152261"/>
-            <a:ext cx="10773177" cy="581472"/>
+            <a:off x="399049" y="347452"/>
+            <a:ext cx="11792951" cy="581472"/>
           </a:xfrm>
         </p:spPr>
         <p:txBody>
@@ -5966,11 +6776,51 @@
           <a:lstStyle/>
           <a:p>
             <a:r>
-              <a:rPr lang="en-GB" sz="3200" dirty="0">
+              <a:rPr lang="en-US" sz="3200" dirty="0">
                 <a:hlinkClick r:id="rId3"/>
               </a:rPr>
-              <a:t>Modelling long- and short-term multi-dimensional patterns in predictive maintenance with accumulative attention</a:t>
-            </a:r>
+              <a:t>Prediction of remaining useful life based on bidirectional gated recurrent</a:t>
+            </a:r>
+            <a:br>
+              <a:rPr lang="en-US" sz="3200" dirty="0">
+                <a:hlinkClick r:id="rId3"/>
+              </a:rPr>
+            </a:br>
+            <a:r>
+              <a:rPr lang="en-US" sz="3200" dirty="0">
+                <a:hlinkClick r:id="rId3"/>
+              </a:rPr>
+              <a:t>unit with temporal </a:t>
+            </a:r>
+            <a:r>
+              <a:rPr lang="en-US" sz="3200" dirty="0" smtClean="0">
+                <a:hlinkClick r:id="rId3"/>
+              </a:rPr>
+              <a:t>self-attention mechanism (</a:t>
+            </a:r>
+            <a:r>
+              <a:rPr lang="en-US" sz="3200" dirty="0" err="1" smtClean="0">
+                <a:hlinkClick r:id="rId3"/>
+              </a:rPr>
+              <a:t>BiGRU</a:t>
+            </a:r>
+            <a:r>
+              <a:rPr lang="en-US" sz="3200" dirty="0" smtClean="0">
+                <a:hlinkClick r:id="rId3"/>
+              </a:rPr>
+              <a:t>-TSAM)</a:t>
+            </a:r>
+            <a:r>
+              <a:rPr lang="en-US" sz="3200" dirty="0">
+                <a:hlinkClick r:id="rId3"/>
+              </a:rPr>
+              <a:t/>
+            </a:r>
+            <a:br>
+              <a:rPr lang="en-US" sz="3200" dirty="0">
+                <a:hlinkClick r:id="rId3"/>
+              </a:rPr>
+            </a:br>
             <a:endParaRPr lang="en-GB" sz="3200" dirty="0"/>
           </a:p>
         </p:txBody>
@@ -6005,9 +6855,10 @@
           <a:p>
             <a:pPr algn="ctr"/>
             <a:r>
-              <a:rPr lang="en-GB" dirty="0"/>
-              <a:t>Reliability Engineering &amp; System Safety (Journal) – Elsevier (Publisher) – September 2023</a:t>
-            </a:r>
+              <a:rPr lang="en-GB" dirty="0" smtClean="0"/>
+              <a:t>Reliability Engineering &amp; System Safety (Journal) – Elsevier (Publisher) – December 2021</a:t>
+            </a:r>
+            <a:endParaRPr lang="en-GB" dirty="0"/>
           </a:p>
         </p:txBody>
       </p:sp>
@@ -6047,69 +6898,110 @@
           </a:fontRef>
         </p:style>
       </p:cxnSp>
+      <p:sp>
+        <p:nvSpPr>
+          <p:cNvPr id="3" name="Rectangle 2"/>
+          <p:cNvSpPr/>
+          <p:nvPr/>
+        </p:nvSpPr>
+        <p:spPr>
+          <a:xfrm>
+            <a:off x="10439728" y="6332634"/>
+            <a:ext cx="1842620" cy="369332"/>
+          </a:xfrm>
+          <a:prstGeom prst="rect">
+            <a:avLst/>
+          </a:prstGeom>
+        </p:spPr>
+        <p:txBody>
+          <a:bodyPr wrap="none">
+            <a:spAutoFit/>
+          </a:bodyPr>
+          <a:lstStyle/>
+          <a:p>
+            <a:r>
+              <a:rPr lang="en-US" dirty="0"/>
+              <a:t>Review/ </a:t>
+            </a:r>
+            <a:r>
+              <a:rPr lang="en-US" dirty="0">
+                <a:solidFill>
+                  <a:srgbClr val="FF0000"/>
+                </a:solidFill>
+              </a:rPr>
+              <a:t>Methods</a:t>
+            </a:r>
+          </a:p>
+        </p:txBody>
+      </p:sp>
       <p:pic>
         <p:nvPicPr>
-          <p:cNvPr id="8" name="Picture 4">
-            <a:extLst>
-              <a:ext uri="{FF2B5EF4-FFF2-40B4-BE49-F238E27FC236}">
-                <a16:creationId xmlns:a16="http://schemas.microsoft.com/office/drawing/2014/main" id="{12F4671E-7F92-A5C8-D2AF-A62734D87A76}"/>
-              </a:ext>
-            </a:extLst>
-          </p:cNvPr>
+          <p:cNvPr id="5" name="Picture 4"/>
           <p:cNvPicPr>
-            <a:picLocks noChangeAspect="1" noChangeArrowheads="1"/>
+            <a:picLocks noChangeAspect="1"/>
           </p:cNvPicPr>
           <p:nvPr/>
         </p:nvPicPr>
         <p:blipFill>
-          <a:blip r:embed="rId4" cstate="hqprint">
-            <a:extLst>
-              <a:ext uri="{28A0092B-C50C-407E-A947-70E740481C1C}">
-                <a14:useLocalDpi xmlns:a14="http://schemas.microsoft.com/office/drawing/2010/main" val="0"/>
-              </a:ext>
-            </a:extLst>
-          </a:blip>
-          <a:srcRect/>
+          <a:blip r:embed="rId4"/>
           <a:stretch>
             <a:fillRect/>
           </a:stretch>
         </p:blipFill>
-        <p:spPr bwMode="auto">
-          <a:xfrm>
-            <a:off x="7657120" y="1227986"/>
-            <a:ext cx="3806797" cy="4197387"/>
+        <p:spPr>
+          <a:xfrm>
+            <a:off x="6617616" y="812833"/>
+            <a:ext cx="5160520" cy="2986495"/>
+          </a:xfrm>
+          <a:prstGeom prst="rect">
+            <a:avLst/>
+          </a:prstGeom>
+        </p:spPr>
+      </p:pic>
+      <p:sp>
+        <p:nvSpPr>
+          <p:cNvPr id="7" name="TextBox 6"/>
+          <p:cNvSpPr txBox="1"/>
+          <p:nvPr/>
+        </p:nvSpPr>
+        <p:spPr>
+          <a:xfrm>
+            <a:off x="497840" y="928924"/>
+            <a:ext cx="4734560" cy="369332"/>
           </a:xfrm>
           <a:prstGeom prst="rect">
             <a:avLst/>
           </a:prstGeom>
           <a:noFill/>
-          <a:extLst>
-            <a:ext uri="{909E8E84-426E-40DD-AFC4-6F175D3DCCD1}">
-              <a14:hiddenFill xmlns:a14="http://schemas.microsoft.com/office/drawing/2010/main">
-                <a:solidFill>
-                  <a:srgbClr val="FFFFFF"/>
-                </a:solidFill>
-              </a14:hiddenFill>
-            </a:ext>
-          </a:extLst>
-        </p:spPr>
-      </p:pic>
-      <p:sp>
-        <p:nvSpPr>
-          <p:cNvPr id="9" name="TextBox 8">
-            <a:extLst>
-              <a:ext uri="{FF2B5EF4-FFF2-40B4-BE49-F238E27FC236}">
-                <a16:creationId xmlns:a16="http://schemas.microsoft.com/office/drawing/2014/main" id="{9F35CFDC-F800-F571-791F-0A0EA46A05E8}"/>
-              </a:ext>
-            </a:extLst>
-          </p:cNvPr>
+        </p:spPr>
+        <p:txBody>
+          <a:bodyPr wrap="square" rtlCol="0">
+            <a:spAutoFit/>
+          </a:bodyPr>
+          <a:lstStyle/>
+          <a:p>
+            <a:pPr marL="285750" indent="-285750">
+              <a:buFont typeface="Arial" panose="020B0604020202020204" pitchFamily="34" charset="0"/>
+              <a:buChar char="•"/>
+            </a:pPr>
+            <a:r>
+              <a:rPr lang="en-US" dirty="0" smtClean="0"/>
+              <a:t>Aircraft turbofan engine/ milling dataset</a:t>
+            </a:r>
+            <a:endParaRPr lang="en-US" dirty="0"/>
+          </a:p>
+        </p:txBody>
+      </p:sp>
+      <p:sp>
+        <p:nvSpPr>
+          <p:cNvPr id="8" name="TextBox 7"/>
           <p:cNvSpPr txBox="1"/>
           <p:nvPr/>
         </p:nvSpPr>
         <p:spPr>
           <a:xfrm>
-            <a:off x="206907" y="1178056"/>
-            <a:ext cx="7450213" cy="4247317"/>
+            <a:off x="641023" y="1477215"/>
+            <a:ext cx="5109328" cy="2031325"/>
           </a:xfrm>
           <a:prstGeom prst="rect">
             <a:avLst/>
@@ -6127,8 +7019,8 @@
               <a:buChar char="•"/>
             </a:pPr>
             <a:r>
-              <a:rPr lang="en-GB" dirty="0"/>
-              <a:t>Temporal Convolution Network (TCN)  - good long-term dependencies &gt;&lt; local patterns </a:t>
+              <a:rPr lang="en-US" dirty="0" smtClean="0"/>
+              <a:t>Temporal self-attention mechanism (TSAM)</a:t>
             </a:r>
           </a:p>
           <a:p>
@@ -6137,8 +7029,16 @@
               <a:buChar char="•"/>
             </a:pPr>
             <a:r>
-              <a:rPr lang="en-GB" dirty="0"/>
-              <a:t>Accumulative self-attention layer (ASA)</a:t>
+              <a:rPr lang="en-US" dirty="0"/>
+              <a:t>Bidirectional gated recurrent neural network (</a:t>
+            </a:r>
+            <a:r>
+              <a:rPr lang="en-US" dirty="0" err="1"/>
+              <a:t>BiGRU</a:t>
+            </a:r>
+            <a:r>
+              <a:rPr lang="en-US" dirty="0" smtClean="0"/>
+              <a:t>)</a:t>
             </a:r>
           </a:p>
           <a:p>
@@ -6147,8 +7047,16 @@
               <a:buChar char="•"/>
             </a:pPr>
             <a:r>
-              <a:rPr lang="en-GB" dirty="0"/>
-              <a:t>Autoregressive component</a:t>
+              <a:rPr lang="en-US" dirty="0" smtClean="0"/>
+              <a:t>Analysis of the interpretability of TSAM layer/ </a:t>
+            </a:r>
+            <a:r>
+              <a:rPr lang="en-US" dirty="0" err="1" smtClean="0"/>
+              <a:t>residul</a:t>
+            </a:r>
+            <a:r>
+              <a:rPr lang="en-US" dirty="0" smtClean="0"/>
+              <a:t> matrices (visualization)</a:t>
             </a:r>
           </a:p>
           <a:p>
@@ -6156,108 +7064,41 @@
               <a:buFont typeface="Arial" panose="020B0604020202020204" pitchFamily="34" charset="0"/>
               <a:buChar char="•"/>
             </a:pPr>
-            <a:r>
-              <a:rPr lang="en-GB" dirty="0"/>
-              <a:t>Lightweight RUL (TCN-ASA)</a:t>
-            </a:r>
+            <a:endParaRPr lang="en-US" dirty="0"/>
           </a:p>
           <a:p>
             <a:pPr marL="285750" indent="-285750">
               <a:buFont typeface="Arial" panose="020B0604020202020204" pitchFamily="34" charset="0"/>
               <a:buChar char="•"/>
             </a:pPr>
-            <a:endParaRPr lang="en-GB" dirty="0"/>
-          </a:p>
-          <a:p>
-            <a:pPr marL="285750" indent="-285750">
-              <a:buFont typeface="Arial" panose="020B0604020202020204" pitchFamily="34" charset="0"/>
-              <a:buChar char="•"/>
-            </a:pPr>
-            <a:endParaRPr lang="en-GB" dirty="0"/>
-          </a:p>
-          <a:p>
-            <a:pPr marL="285750" indent="-285750">
-              <a:buFont typeface="Arial" panose="020B0604020202020204" pitchFamily="34" charset="0"/>
-              <a:buChar char="•"/>
-            </a:pPr>
-            <a:r>
-              <a:rPr lang="en-GB" dirty="0"/>
-              <a:t>Transformer </a:t>
-            </a:r>
-            <a:r>
-              <a:rPr lang="en-GB" dirty="0">
-                <a:sym typeface="Wingdings" panose="05000000000000000000" pitchFamily="2" charset="2"/>
-              </a:rPr>
-              <a:t>Sparse Transformer (Reduce the computational complexity/ some cells are abandoned for attention, which leads information loss)  </a:t>
-            </a:r>
-            <a:r>
-              <a:rPr lang="en-GB" b="1" dirty="0">
-                <a:sym typeface="Wingdings" panose="05000000000000000000" pitchFamily="2" charset="2"/>
-              </a:rPr>
-              <a:t>How to design a lightweight but effective self-attention mechanism?</a:t>
-            </a:r>
-          </a:p>
-          <a:p>
-            <a:endParaRPr lang="en-GB" dirty="0">
-              <a:sym typeface="Wingdings" panose="05000000000000000000" pitchFamily="2" charset="2"/>
-            </a:endParaRPr>
-          </a:p>
-          <a:p>
-            <a:pPr marL="285750" indent="-285750">
-              <a:buFont typeface="Arial" panose="020B0604020202020204" pitchFamily="34" charset="0"/>
-              <a:buChar char="•"/>
-            </a:pPr>
-            <a:r>
-              <a:rPr lang="en-GB" b="1" dirty="0">
-                <a:sym typeface="Wingdings" panose="05000000000000000000" pitchFamily="2" charset="2"/>
-              </a:rPr>
-              <a:t>Research Gap</a:t>
-            </a:r>
-            <a:r>
-              <a:rPr lang="en-GB" dirty="0">
-                <a:sym typeface="Wingdings" panose="05000000000000000000" pitchFamily="2" charset="2"/>
-              </a:rPr>
-              <a:t>: </a:t>
-            </a:r>
-          </a:p>
-          <a:p>
-            <a:pPr marL="742950" lvl="1" indent="-285750">
-              <a:buFont typeface="Arial" panose="020B0604020202020204" pitchFamily="34" charset="0"/>
-              <a:buChar char="•"/>
-            </a:pPr>
-            <a:r>
-              <a:rPr lang="en-GB" dirty="0">
-                <a:sym typeface="Wingdings" panose="05000000000000000000" pitchFamily="2" charset="2"/>
-              </a:rPr>
-              <a:t>sequential models face input length restrictions </a:t>
-            </a:r>
-          </a:p>
-          <a:p>
-            <a:pPr marL="742950" lvl="1" indent="-285750">
-              <a:buFont typeface="Arial" panose="020B0604020202020204" pitchFamily="34" charset="0"/>
-              <a:buChar char="•"/>
-            </a:pPr>
-            <a:r>
-              <a:rPr lang="en-GB" dirty="0">
-                <a:sym typeface="Wingdings" panose="05000000000000000000" pitchFamily="2" charset="2"/>
-              </a:rPr>
-              <a:t>Disadvantages in local feature extraction (temporal and spatial)</a:t>
-            </a:r>
-          </a:p>
-          <a:p>
-            <a:pPr marL="742950" lvl="1" indent="-285750">
-              <a:buFont typeface="Arial" panose="020B0604020202020204" pitchFamily="34" charset="0"/>
-              <a:buChar char="•"/>
-            </a:pPr>
-            <a:r>
-              <a:rPr lang="en-GB" dirty="0">
-                <a:sym typeface="Wingdings" panose="05000000000000000000" pitchFamily="2" charset="2"/>
-              </a:rPr>
-              <a:t>Prediction model is still in shortage for predictive maintenance</a:t>
-            </a:r>
-          </a:p>
-        </p:txBody>
-      </p:sp>
+            <a:endParaRPr lang="en-US" dirty="0"/>
+          </a:p>
+        </p:txBody>
+      </p:sp>
+      <p:pic>
+        <p:nvPicPr>
+          <p:cNvPr id="9" name="Picture 8"/>
+          <p:cNvPicPr>
+            <a:picLocks noChangeAspect="1"/>
+          </p:cNvPicPr>
+          <p:nvPr/>
+        </p:nvPicPr>
+        <p:blipFill>
+          <a:blip r:embed="rId5"/>
+          <a:stretch>
+            <a:fillRect/>
+          </a:stretch>
+        </p:blipFill>
+        <p:spPr>
+          <a:xfrm>
+            <a:off x="474464" y="3091481"/>
+            <a:ext cx="5275887" cy="2905125"/>
+          </a:xfrm>
+          <a:prstGeom prst="rect">
+            <a:avLst/>
+          </a:prstGeom>
+        </p:spPr>
+      </p:pic>
     </p:spTree>
     <p:extLst>
       <p:ext uri="{BB962C8B-B14F-4D97-AF65-F5344CB8AC3E}">
@@ -6306,8 +7147,8 @@
         </p:nvSpPr>
         <p:spPr>
           <a:xfrm>
-            <a:off x="489397" y="152261"/>
-            <a:ext cx="10773177" cy="581472"/>
+            <a:off x="199524" y="223035"/>
+            <a:ext cx="11792951" cy="581472"/>
           </a:xfrm>
         </p:spPr>
         <p:txBody>
@@ -6317,10 +7158,22 @@
           <a:lstStyle/>
           <a:p>
             <a:r>
-              <a:rPr lang="en-GB" sz="3200" dirty="0">
+              <a:rPr lang="en-US" sz="3200" dirty="0">
                 <a:hlinkClick r:id="rId3"/>
               </a:rPr>
-              <a:t>Modelling long- and short-term multi-dimensional patterns in predictive maintenance with accumulative attention</a:t>
+              <a:t>Domain Adaptation Remaining Useful Life Prediction Method Based on </a:t>
+            </a:r>
+            <a:r>
+              <a:rPr lang="en-US" sz="3200" dirty="0" err="1">
+                <a:hlinkClick r:id="rId3"/>
+              </a:rPr>
+              <a:t>AdaBN</a:t>
+            </a:r>
+            <a:r>
+              <a:rPr lang="en-US" sz="3200" dirty="0">
+                <a:hlinkClick r:id="rId3"/>
+              </a:rPr>
+              <a:t>-DCNN</a:t>
             </a:r>
             <a:endParaRPr lang="en-GB" sz="3200" dirty="0"/>
           </a:p>
@@ -6356,9 +7209,34 @@
           <a:p>
             <a:pPr algn="ctr"/>
             <a:r>
-              <a:rPr lang="en-GB" dirty="0"/>
-              <a:t>Computer &amp; Industrial Engineering (Journal) – Elsevier (Publisher) – December 2020</a:t>
-            </a:r>
+              <a:rPr lang="en-US" dirty="0"/>
+              <a:t>Prognostics and System Health Management </a:t>
+            </a:r>
+            <a:r>
+              <a:rPr lang="en-GB" dirty="0" smtClean="0"/>
+              <a:t>(Conference) </a:t>
+            </a:r>
+            <a:r>
+              <a:rPr lang="en-GB" dirty="0" smtClean="0"/>
+              <a:t>– </a:t>
+            </a:r>
+            <a:r>
+              <a:rPr lang="en-GB" dirty="0" smtClean="0"/>
+              <a:t>IEEE</a:t>
+            </a:r>
+            <a:r>
+              <a:rPr lang="en-GB" dirty="0" smtClean="0"/>
+              <a:t> </a:t>
+            </a:r>
+            <a:r>
+              <a:rPr lang="en-GB" dirty="0" smtClean="0"/>
+              <a:t>(Publisher) – December </a:t>
+            </a:r>
+            <a:r>
+              <a:rPr lang="en-GB" dirty="0" smtClean="0"/>
+              <a:t>2019</a:t>
+            </a:r>
+            <a:endParaRPr lang="en-GB" dirty="0"/>
           </a:p>
         </p:txBody>
       </p:sp>
@@ -6398,56 +7276,180 @@
           </a:fontRef>
         </p:style>
       </p:cxnSp>
+      <p:sp>
+        <p:nvSpPr>
+          <p:cNvPr id="3" name="Rectangle 2"/>
+          <p:cNvSpPr/>
+          <p:nvPr/>
+        </p:nvSpPr>
+        <p:spPr>
+          <a:xfrm>
+            <a:off x="10439728" y="6332634"/>
+            <a:ext cx="1842620" cy="369332"/>
+          </a:xfrm>
+          <a:prstGeom prst="rect">
+            <a:avLst/>
+          </a:prstGeom>
+        </p:spPr>
+        <p:txBody>
+          <a:bodyPr wrap="none">
+            <a:spAutoFit/>
+          </a:bodyPr>
+          <a:lstStyle/>
+          <a:p>
+            <a:r>
+              <a:rPr lang="en-US" dirty="0"/>
+              <a:t>Review/ </a:t>
+            </a:r>
+            <a:r>
+              <a:rPr lang="en-US" dirty="0">
+                <a:solidFill>
+                  <a:srgbClr val="FF0000"/>
+                </a:solidFill>
+              </a:rPr>
+              <a:t>Methods</a:t>
+            </a:r>
+          </a:p>
+        </p:txBody>
+      </p:sp>
+      <p:sp>
+        <p:nvSpPr>
+          <p:cNvPr id="7" name="TextBox 6"/>
+          <p:cNvSpPr txBox="1"/>
+          <p:nvPr/>
+        </p:nvSpPr>
+        <p:spPr>
+          <a:xfrm>
+            <a:off x="516694" y="1040906"/>
+            <a:ext cx="4734560" cy="1754326"/>
+          </a:xfrm>
+          <a:prstGeom prst="rect">
+            <a:avLst/>
+          </a:prstGeom>
+          <a:noFill/>
+        </p:spPr>
+        <p:txBody>
+          <a:bodyPr wrap="square" rtlCol="0">
+            <a:spAutoFit/>
+          </a:bodyPr>
+          <a:lstStyle/>
+          <a:p>
+            <a:pPr marL="285750" indent="-285750">
+              <a:buFont typeface="Arial" panose="020B0604020202020204" pitchFamily="34" charset="0"/>
+              <a:buChar char="•"/>
+            </a:pPr>
+            <a:r>
+              <a:rPr lang="en-US" dirty="0" smtClean="0"/>
+              <a:t>Aircraft turbofan engine/ milling </a:t>
+            </a:r>
+            <a:r>
+              <a:rPr lang="en-US" dirty="0" smtClean="0"/>
+              <a:t>dataset</a:t>
+            </a:r>
+          </a:p>
+          <a:p>
+            <a:pPr marL="285750" indent="-285750">
+              <a:buFont typeface="Arial" panose="020B0604020202020204" pitchFamily="34" charset="0"/>
+              <a:buChar char="•"/>
+            </a:pPr>
+            <a:r>
+              <a:rPr lang="en-US" dirty="0"/>
+              <a:t>Adaptive Batch Normalization (</a:t>
+            </a:r>
+            <a:r>
+              <a:rPr lang="en-US" dirty="0" err="1"/>
+              <a:t>AdaBN</a:t>
+            </a:r>
+            <a:r>
+              <a:rPr lang="en-US" dirty="0" smtClean="0"/>
+              <a:t>)</a:t>
+            </a:r>
+          </a:p>
+          <a:p>
+            <a:pPr marL="285750" indent="-285750">
+              <a:buFont typeface="Arial" panose="020B0604020202020204" pitchFamily="34" charset="0"/>
+              <a:buChar char="•"/>
+            </a:pPr>
+            <a:r>
+              <a:rPr lang="en-US" dirty="0" smtClean="0"/>
+              <a:t>Fine-tune data </a:t>
+            </a:r>
+          </a:p>
+          <a:p>
+            <a:pPr marL="285750" indent="-285750">
+              <a:buFont typeface="Arial" panose="020B0604020202020204" pitchFamily="34" charset="0"/>
+              <a:buChar char="•"/>
+            </a:pPr>
+            <a:r>
+              <a:rPr lang="en-US" dirty="0" smtClean="0"/>
+              <a:t>Improve the predictive results under different data domains</a:t>
+            </a:r>
+          </a:p>
+          <a:p>
+            <a:pPr marL="285750" indent="-285750">
+              <a:buFont typeface="Arial" panose="020B0604020202020204" pitchFamily="34" charset="0"/>
+              <a:buChar char="•"/>
+            </a:pPr>
+            <a:r>
+              <a:rPr lang="en-US" dirty="0" smtClean="0"/>
+              <a:t>Quickly </a:t>
+            </a:r>
+            <a:endParaRPr lang="en-US" dirty="0"/>
+          </a:p>
+        </p:txBody>
+      </p:sp>
       <p:pic>
         <p:nvPicPr>
-          <p:cNvPr id="3" name="Picture 2" descr="A diagram of a diagram&#10;&#10;Description automatically generated">
-            <a:extLst>
-              <a:ext uri="{FF2B5EF4-FFF2-40B4-BE49-F238E27FC236}">
-                <a16:creationId xmlns:a16="http://schemas.microsoft.com/office/drawing/2014/main" id="{7ECCB0C4-C468-0024-663D-9609DB838F7B}"/>
-              </a:ext>
-            </a:extLst>
-          </p:cNvPr>
+          <p:cNvPr id="10" name="Picture 9"/>
           <p:cNvPicPr>
-            <a:picLocks noChangeAspect="1" noChangeArrowheads="1"/>
+            <a:picLocks noChangeAspect="1"/>
           </p:cNvPicPr>
           <p:nvPr/>
         </p:nvPicPr>
         <p:blipFill>
-          <a:blip r:embed="rId4">
-            <a:extLst>
-              <a:ext uri="{28A0092B-C50C-407E-A947-70E740481C1C}">
-                <a14:useLocalDpi xmlns:a14="http://schemas.microsoft.com/office/drawing/2010/main" val="0"/>
-              </a:ext>
-            </a:extLst>
-          </a:blip>
+          <a:blip r:embed="rId4"/>
           <a:stretch>
             <a:fillRect/>
           </a:stretch>
         </p:blipFill>
-        <p:spPr bwMode="auto">
-          <a:xfrm>
-            <a:off x="1355493" y="1203848"/>
-            <a:ext cx="9223436" cy="4450303"/>
+        <p:spPr>
+          <a:xfrm>
+            <a:off x="6857018" y="604892"/>
+            <a:ext cx="4813366" cy="5311564"/>
           </a:xfrm>
           <a:prstGeom prst="rect">
             <a:avLst/>
           </a:prstGeom>
-          <a:noFill/>
-          <a:extLst>
-            <a:ext uri="{909E8E84-426E-40DD-AFC4-6F175D3DCCD1}">
-              <a14:hiddenFill xmlns:a14="http://schemas.microsoft.com/office/drawing/2010/main">
-                <a:solidFill>
-                  <a:srgbClr val="FFFFFF"/>
-                </a:solidFill>
-              </a14:hiddenFill>
-            </a:ext>
-          </a:extLst>
+        </p:spPr>
+      </p:pic>
+      <p:pic>
+        <p:nvPicPr>
+          <p:cNvPr id="11" name="Picture 10"/>
+          <p:cNvPicPr>
+            <a:picLocks noChangeAspect="1"/>
+          </p:cNvPicPr>
+          <p:nvPr/>
+        </p:nvPicPr>
+        <p:blipFill>
+          <a:blip r:embed="rId5"/>
+          <a:stretch>
+            <a:fillRect/>
+          </a:stretch>
+        </p:blipFill>
+        <p:spPr>
+          <a:xfrm>
+            <a:off x="842761" y="3421390"/>
+            <a:ext cx="5124450" cy="1990725"/>
+          </a:xfrm>
+          <a:prstGeom prst="rect">
+            <a:avLst/>
+          </a:prstGeom>
         </p:spPr>
       </p:pic>
     </p:spTree>
     <p:extLst>
       <p:ext uri="{BB962C8B-B14F-4D97-AF65-F5344CB8AC3E}">
-        <p14:creationId xmlns:p14="http://schemas.microsoft.com/office/powerpoint/2010/main" val="2621861322"/>
+        <p14:creationId xmlns:p14="http://schemas.microsoft.com/office/powerpoint/2010/main" val="2860590613"/>
       </p:ext>
     </p:extLst>
   </p:cSld>
@@ -6492,25 +7494,23 @@
         </p:nvSpPr>
         <p:spPr>
           <a:xfrm>
-            <a:off x="1" y="152261"/>
-            <a:ext cx="12192000" cy="581472"/>
+            <a:off x="199524" y="223035"/>
+            <a:ext cx="11792951" cy="581472"/>
           </a:xfrm>
         </p:spPr>
         <p:txBody>
           <a:bodyPr>
-            <a:normAutofit/>
+            <a:normAutofit fontScale="90000"/>
           </a:bodyPr>
           <a:lstStyle/>
           <a:p>
-            <a:pPr algn="ctr"/>
-            <a:r>
-              <a:rPr lang="en-GB" sz="3200" dirty="0" err="1"/>
-              <a:t>TSMixer</a:t>
-            </a:r>
-            <a:r>
-              <a:rPr lang="en-GB" sz="3200" dirty="0"/>
-              <a:t>: An All-MLP Architecture for Time Series Fore casting</a:t>
-            </a:r>
+            <a:r>
+              <a:rPr lang="en-US" sz="3200" dirty="0">
+                <a:hlinkClick r:id="rId3"/>
+              </a:rPr>
+              <a:t>An integrated multi-head dual sparse self-attention network for remaining useful life prediction</a:t>
+            </a:r>
+            <a:endParaRPr lang="en-GB" sz="3200" dirty="0"/>
           </a:p>
         </p:txBody>
       </p:sp>
@@ -6544,13 +7544,34 @@
           <a:p>
             <a:pPr algn="ctr"/>
             <a:r>
-              <a:rPr lang="en-GB" dirty="0" err="1"/>
-              <a:t>arXiv</a:t>
+              <a:rPr lang="en-US" dirty="0"/>
+              <a:t>Reliability Engineering and System Safety </a:t>
             </a:r>
             <a:r>
               <a:rPr lang="en-GB" dirty="0"/>
-              <a:t> – CS| ML – September 2023</a:t>
-            </a:r>
+              <a:t>(Journals) </a:t>
+            </a:r>
+            <a:r>
+              <a:rPr lang="en-GB" dirty="0" smtClean="0"/>
+              <a:t>– </a:t>
+            </a:r>
+            <a:r>
+              <a:rPr lang="en-GB" dirty="0" smtClean="0"/>
+              <a:t>Elsevier</a:t>
+            </a:r>
+            <a:r>
+              <a:rPr lang="en-GB" dirty="0" smtClean="0"/>
+              <a:t> </a:t>
+            </a:r>
+            <a:r>
+              <a:rPr lang="en-GB" dirty="0" smtClean="0"/>
+              <a:t>(Publisher) – </a:t>
+            </a:r>
+            <a:r>
+              <a:rPr lang="en-GB" dirty="0" smtClean="0"/>
+              <a:t>January 2023</a:t>
+            </a:r>
+            <a:endParaRPr lang="en-GB" dirty="0"/>
           </a:p>
         </p:txBody>
       </p:sp>
@@ -6590,30 +7611,60 @@
           </a:fontRef>
         </p:style>
       </p:cxnSp>
+      <p:sp>
+        <p:nvSpPr>
+          <p:cNvPr id="3" name="Rectangle 2"/>
+          <p:cNvSpPr/>
+          <p:nvPr/>
+        </p:nvSpPr>
+        <p:spPr>
+          <a:xfrm>
+            <a:off x="10439728" y="6332634"/>
+            <a:ext cx="1842620" cy="369332"/>
+          </a:xfrm>
+          <a:prstGeom prst="rect">
+            <a:avLst/>
+          </a:prstGeom>
+        </p:spPr>
+        <p:txBody>
+          <a:bodyPr wrap="none">
+            <a:spAutoFit/>
+          </a:bodyPr>
+          <a:lstStyle/>
+          <a:p>
+            <a:r>
+              <a:rPr lang="en-US" dirty="0"/>
+              <a:t>Review/ </a:t>
+            </a:r>
+            <a:r>
+              <a:rPr lang="en-US" dirty="0">
+                <a:solidFill>
+                  <a:srgbClr val="FF0000"/>
+                </a:solidFill>
+              </a:rPr>
+              <a:t>Methods</a:t>
+            </a:r>
+          </a:p>
+        </p:txBody>
+      </p:sp>
       <p:pic>
         <p:nvPicPr>
-          <p:cNvPr id="7" name="Picture 6">
-            <a:extLst>
-              <a:ext uri="{FF2B5EF4-FFF2-40B4-BE49-F238E27FC236}">
-                <a16:creationId xmlns:a16="http://schemas.microsoft.com/office/drawing/2014/main" id="{BAA89558-26CC-3AB8-BAD5-32E34B77F5AA}"/>
-              </a:ext>
-            </a:extLst>
-          </p:cNvPr>
+          <p:cNvPr id="5" name="Picture 4"/>
           <p:cNvPicPr>
             <a:picLocks noChangeAspect="1"/>
           </p:cNvPicPr>
           <p:nvPr/>
         </p:nvPicPr>
         <p:blipFill>
-          <a:blip r:embed="rId3"/>
+          <a:blip r:embed="rId4"/>
           <a:stretch>
             <a:fillRect/>
           </a:stretch>
         </p:blipFill>
         <p:spPr>
           <a:xfrm>
-            <a:off x="6244107" y="1075024"/>
-            <a:ext cx="5533778" cy="4771984"/>
+            <a:off x="4706225" y="1066169"/>
+            <a:ext cx="7286250" cy="3846136"/>
           </a:xfrm>
           <a:prstGeom prst="rect">
             <a:avLst/>
@@ -6622,20 +7673,14 @@
       </p:pic>
       <p:sp>
         <p:nvSpPr>
-          <p:cNvPr id="8" name="TextBox 7">
-            <a:extLst>
-              <a:ext uri="{FF2B5EF4-FFF2-40B4-BE49-F238E27FC236}">
-                <a16:creationId xmlns:a16="http://schemas.microsoft.com/office/drawing/2014/main" id="{563D71C0-E3A4-A29D-CCCD-0C016BDC7E45}"/>
-              </a:ext>
-            </a:extLst>
-          </p:cNvPr>
+          <p:cNvPr id="8" name="TextBox 7"/>
           <p:cNvSpPr txBox="1"/>
           <p:nvPr/>
         </p:nvSpPr>
         <p:spPr>
           <a:xfrm>
-            <a:off x="244699" y="662068"/>
-            <a:ext cx="5525036" cy="923330"/>
+            <a:off x="199524" y="1234911"/>
+            <a:ext cx="4664708" cy="5078313"/>
           </a:xfrm>
           <a:prstGeom prst="rect">
             <a:avLst/>
@@ -6653,8 +7698,44 @@
               <a:buChar char="•"/>
             </a:pPr>
             <a:r>
-              <a:rPr lang="en-GB" dirty="0"/>
-              <a:t>Google Cloud AI Research</a:t>
+              <a:rPr lang="en-US" dirty="0"/>
+              <a:t>A</a:t>
+            </a:r>
+            <a:r>
+              <a:rPr lang="en-US" dirty="0" smtClean="0"/>
+              <a:t> </a:t>
+            </a:r>
+            <a:r>
+              <a:rPr lang="en-US" dirty="0"/>
+              <a:t>multi-head </a:t>
+            </a:r>
+            <a:r>
+              <a:rPr lang="en-US" dirty="0" err="1"/>
+              <a:t>ProbSparse</a:t>
+            </a:r>
+            <a:r>
+              <a:rPr lang="en-US" dirty="0"/>
+              <a:t> self-attention network (MPSN) </a:t>
+            </a:r>
+            <a:r>
+              <a:rPr lang="en-US" dirty="0" smtClean="0"/>
+              <a:t>- (</a:t>
+            </a:r>
+            <a:r>
+              <a:rPr lang="en-US" dirty="0"/>
+              <a:t>𝑂(𝐿𝑙𝑛𝐿</a:t>
+            </a:r>
+            <a:r>
+              <a:rPr lang="en-US" dirty="0" smtClean="0"/>
+              <a:t>) </a:t>
+            </a:r>
+            <a:r>
+              <a:rPr lang="en-US" dirty="0"/>
+              <a:t>&lt; 𝑂 </a:t>
+            </a:r>
+            <a:r>
+              <a:rPr lang="en-US" dirty="0" smtClean="0"/>
+              <a:t>(𝐿2))</a:t>
             </a:r>
           </a:p>
           <a:p>
@@ -6663,80 +7744,51 @@
               <a:buChar char="•"/>
             </a:pPr>
             <a:r>
-              <a:rPr lang="en-GB" dirty="0">
-                <a:hlinkClick r:id="rId4"/>
-              </a:rPr>
-              <a:t>https://github.com/google-research/google-research/tree/master/tsmixer</a:t>
-            </a:r>
-            <a:endParaRPr lang="en-GB" dirty="0"/>
-          </a:p>
-        </p:txBody>
-      </p:sp>
-      <p:pic>
-        <p:nvPicPr>
-          <p:cNvPr id="12" name="Picture 11">
-            <a:extLst>
-              <a:ext uri="{FF2B5EF4-FFF2-40B4-BE49-F238E27FC236}">
-                <a16:creationId xmlns:a16="http://schemas.microsoft.com/office/drawing/2014/main" id="{E0B6134E-9D77-636E-86AC-5E073246680F}"/>
-              </a:ext>
-            </a:extLst>
-          </p:cNvPr>
-          <p:cNvPicPr>
-            <a:picLocks noChangeAspect="1"/>
-          </p:cNvPicPr>
-          <p:nvPr/>
-        </p:nvPicPr>
-        <p:blipFill>
-          <a:blip r:embed="rId5"/>
-          <a:stretch>
-            <a:fillRect/>
-          </a:stretch>
-        </p:blipFill>
-        <p:spPr>
-          <a:xfrm>
-            <a:off x="470822" y="1955271"/>
-            <a:ext cx="5298913" cy="2848549"/>
-          </a:xfrm>
-          <a:prstGeom prst="rect">
-            <a:avLst/>
-          </a:prstGeom>
-        </p:spPr>
-      </p:pic>
-      <p:sp>
-        <p:nvSpPr>
-          <p:cNvPr id="13" name="TextBox 12">
-            <a:extLst>
-              <a:ext uri="{FF2B5EF4-FFF2-40B4-BE49-F238E27FC236}">
-                <a16:creationId xmlns:a16="http://schemas.microsoft.com/office/drawing/2014/main" id="{63FAF0F6-7396-6519-4D16-F00F58B409A8}"/>
-              </a:ext>
-            </a:extLst>
-          </p:cNvPr>
-          <p:cNvSpPr txBox="1"/>
-          <p:nvPr/>
-        </p:nvSpPr>
-        <p:spPr>
-          <a:xfrm>
-            <a:off x="470822" y="4700789"/>
-            <a:ext cx="4983381" cy="646331"/>
-          </a:xfrm>
-          <a:prstGeom prst="rect">
-            <a:avLst/>
-          </a:prstGeom>
-          <a:noFill/>
-        </p:spPr>
-        <p:txBody>
-          <a:bodyPr wrap="square" rtlCol="0">
-            <a:spAutoFit/>
-          </a:bodyPr>
-          <a:lstStyle/>
+              <a:rPr lang="en-US" dirty="0" smtClean="0"/>
+              <a:t>A multi-head </a:t>
+            </a:r>
+            <a:r>
+              <a:rPr lang="en-US" dirty="0" err="1"/>
+              <a:t>LogSparse</a:t>
+            </a:r>
+            <a:r>
+              <a:rPr lang="en-US" dirty="0"/>
+              <a:t> self-attention network (MLSN) </a:t>
+            </a:r>
+            <a:r>
+              <a:rPr lang="en-US" dirty="0" smtClean="0"/>
+              <a:t>- 𝑂</a:t>
+            </a:r>
+            <a:r>
+              <a:rPr lang="en-US" dirty="0"/>
+              <a:t>((𝑙𝑜𝑔2𝐿) 2 )</a:t>
+            </a:r>
+            <a:endParaRPr lang="en-US" dirty="0" smtClean="0"/>
+          </a:p>
           <a:p>
             <a:pPr marL="285750" indent="-285750">
               <a:buFont typeface="Arial" panose="020B0604020202020204" pitchFamily="34" charset="0"/>
               <a:buChar char="•"/>
             </a:pPr>
             <a:r>
-              <a:rPr lang="en-GB" dirty="0"/>
-              <a:t>Previous DL tend to overfit the data</a:t>
+              <a:rPr lang="en-US" dirty="0" smtClean="0"/>
+              <a:t>A </a:t>
+            </a:r>
+            <a:r>
+              <a:rPr lang="en-US" dirty="0"/>
+              <a:t>novel integrated multi-head dual </a:t>
+            </a:r>
+            <a:r>
+              <a:rPr lang="en-US" dirty="0" smtClean="0"/>
+              <a:t>sparse self-attention </a:t>
+            </a:r>
+            <a:r>
+              <a:rPr lang="en-US" dirty="0"/>
+              <a:t>network (IMDSSN</a:t>
+            </a:r>
+            <a:r>
+              <a:rPr lang="en-US" dirty="0" smtClean="0"/>
+              <a:t>)</a:t>
             </a:r>
           </a:p>
           <a:p>
@@ -6745,8 +7797,167 @@
               <a:buChar char="•"/>
             </a:pPr>
             <a:r>
-              <a:rPr lang="en-GB" dirty="0"/>
-              <a:t>“time-step-dependent” &gt;&lt; “data-dependent”</a:t>
+              <a:rPr lang="en-US" dirty="0" smtClean="0"/>
+              <a:t>Local regions and computational complexity</a:t>
+            </a:r>
+          </a:p>
+          <a:p>
+            <a:pPr marL="285750" indent="-285750">
+              <a:buFont typeface="Arial" panose="020B0604020202020204" pitchFamily="34" charset="0"/>
+              <a:buChar char="•"/>
+            </a:pPr>
+            <a:r>
+              <a:rPr lang="en-US" u="sng" dirty="0" smtClean="0"/>
+              <a:t>CNN limitations</a:t>
+            </a:r>
+            <a:r>
+              <a:rPr lang="en-US" dirty="0" smtClean="0"/>
+              <a:t>: the size of convolution </a:t>
+            </a:r>
+            <a:r>
+              <a:rPr lang="en-US" dirty="0" smtClean="0">
+                <a:sym typeface="Wingdings" panose="05000000000000000000" pitchFamily="2" charset="2"/>
+              </a:rPr>
+              <a:t> challenging to capture long-distance features</a:t>
+            </a:r>
+          </a:p>
+          <a:p>
+            <a:pPr marL="285750" indent="-285750">
+              <a:buFont typeface="Arial" panose="020B0604020202020204" pitchFamily="34" charset="0"/>
+              <a:buChar char="•"/>
+            </a:pPr>
+            <a:r>
+              <a:rPr lang="en-US" u="sng" dirty="0" smtClean="0">
+                <a:sym typeface="Wingdings" panose="05000000000000000000" pitchFamily="2" charset="2"/>
+              </a:rPr>
+              <a:t>RNN limitations</a:t>
+            </a:r>
+            <a:r>
+              <a:rPr lang="en-US" dirty="0" smtClean="0">
+                <a:sym typeface="Wingdings" panose="05000000000000000000" pitchFamily="2" charset="2"/>
+              </a:rPr>
+              <a:t>: cannot construct the associations between non-adjacent data</a:t>
+            </a:r>
+          </a:p>
+          <a:p>
+            <a:pPr marL="285750" indent="-285750">
+              <a:buFont typeface="Arial" panose="020B0604020202020204" pitchFamily="34" charset="0"/>
+              <a:buChar char="•"/>
+            </a:pPr>
+            <a:r>
+              <a:rPr lang="en-US" u="sng" dirty="0">
+                <a:sym typeface="Wingdings" panose="05000000000000000000" pitchFamily="2" charset="2"/>
+              </a:rPr>
+              <a:t>Conventional </a:t>
+            </a:r>
+            <a:r>
+              <a:rPr lang="en-US" u="sng" dirty="0" smtClean="0">
+                <a:sym typeface="Wingdings" panose="05000000000000000000" pitchFamily="2" charset="2"/>
+              </a:rPr>
+              <a:t>Transformers</a:t>
+            </a:r>
+            <a:r>
+              <a:rPr lang="en-US" dirty="0" smtClean="0">
+                <a:sym typeface="Wingdings" panose="05000000000000000000" pitchFamily="2" charset="2"/>
+              </a:rPr>
+              <a:t> limitation: </a:t>
+            </a:r>
+          </a:p>
+          <a:p>
+            <a:pPr marL="742950" lvl="1" indent="-285750">
+              <a:buFont typeface="Arial" panose="020B0604020202020204" pitchFamily="34" charset="0"/>
+              <a:buChar char="•"/>
+            </a:pPr>
+            <a:r>
+              <a:rPr lang="en-US" dirty="0" smtClean="0">
+                <a:sym typeface="Wingdings" panose="05000000000000000000" pitchFamily="2" charset="2"/>
+              </a:rPr>
+              <a:t>decrease </a:t>
+            </a:r>
+            <a:r>
+              <a:rPr lang="en-US" dirty="0">
+                <a:sym typeface="Wingdings" panose="05000000000000000000" pitchFamily="2" charset="2"/>
+              </a:rPr>
+              <a:t>the sensitivity to the significant local </a:t>
+            </a:r>
+            <a:r>
+              <a:rPr lang="en-US" dirty="0" smtClean="0">
+                <a:sym typeface="Wingdings" panose="05000000000000000000" pitchFamily="2" charset="2"/>
+              </a:rPr>
+              <a:t>regions</a:t>
+            </a:r>
+          </a:p>
+          <a:p>
+            <a:pPr marL="742950" lvl="1" indent="-285750">
+              <a:buFont typeface="Arial" panose="020B0604020202020204" pitchFamily="34" charset="0"/>
+              <a:buChar char="•"/>
+            </a:pPr>
+            <a:r>
+              <a:rPr lang="en-US" dirty="0"/>
+              <a:t>computational complexity increases </a:t>
+            </a:r>
+            <a:r>
+              <a:rPr lang="en-US" dirty="0" err="1"/>
+              <a:t>quadratically</a:t>
+            </a:r>
+            <a:r>
+              <a:rPr lang="en-US" dirty="0"/>
+              <a:t> with the time window </a:t>
+            </a:r>
+            <a:r>
+              <a:rPr lang="en-US" dirty="0" smtClean="0"/>
+              <a:t>length</a:t>
+            </a:r>
+          </a:p>
+          <a:p>
+            <a:pPr marL="285750" indent="-285750">
+              <a:buFont typeface="Arial" panose="020B0604020202020204" pitchFamily="34" charset="0"/>
+              <a:buChar char="•"/>
+            </a:pPr>
+            <a:r>
+              <a:rPr lang="en-US" dirty="0" smtClean="0"/>
+              <a:t>Embedded features + positional information</a:t>
+            </a:r>
+            <a:endParaRPr lang="en-US" dirty="0"/>
+          </a:p>
+        </p:txBody>
+      </p:sp>
+      <p:sp>
+        <p:nvSpPr>
+          <p:cNvPr id="12" name="Rectangle 11"/>
+          <p:cNvSpPr/>
+          <p:nvPr/>
+        </p:nvSpPr>
+        <p:spPr>
+          <a:xfrm>
+            <a:off x="5063756" y="4944503"/>
+            <a:ext cx="3144130" cy="369332"/>
+          </a:xfrm>
+          <a:prstGeom prst="rect">
+            <a:avLst/>
+          </a:prstGeom>
+        </p:spPr>
+        <p:txBody>
+          <a:bodyPr wrap="none">
+            <a:spAutoFit/>
+          </a:bodyPr>
+          <a:lstStyle/>
+          <a:p>
+            <a:r>
+              <a:rPr lang="en-US" dirty="0" err="1"/>
+              <a:t>Kullback</a:t>
+            </a:r>
+            <a:r>
+              <a:rPr lang="en-US" dirty="0"/>
+              <a:t> </a:t>
+            </a:r>
+            <a:r>
+              <a:rPr lang="en-US" dirty="0" err="1"/>
+              <a:t>Leibler</a:t>
+            </a:r>
+            <a:r>
+              <a:rPr lang="en-US" dirty="0"/>
+              <a:t> (KL) divergence</a:t>
             </a:r>
           </a:p>
         </p:txBody>
@@ -6754,7 +7965,7 @@
     </p:spTree>
     <p:extLst>
       <p:ext uri="{BB962C8B-B14F-4D97-AF65-F5344CB8AC3E}">
-        <p14:creationId xmlns:p14="http://schemas.microsoft.com/office/powerpoint/2010/main" val="40973893"/>
+        <p14:creationId xmlns:p14="http://schemas.microsoft.com/office/powerpoint/2010/main" val="561746116"/>
       </p:ext>
     </p:extLst>
   </p:cSld>
@@ -6799,21 +8010,23 @@
         </p:nvSpPr>
         <p:spPr>
           <a:xfrm>
-            <a:off x="1" y="152261"/>
-            <a:ext cx="12192000" cy="581472"/>
+            <a:off x="489397" y="152261"/>
+            <a:ext cx="10773177" cy="581472"/>
           </a:xfrm>
         </p:spPr>
         <p:txBody>
           <a:bodyPr>
-            <a:normAutofit/>
+            <a:normAutofit fontScale="90000"/>
           </a:bodyPr>
           <a:lstStyle/>
           <a:p>
-            <a:pPr algn="ctr"/>
-            <a:r>
-              <a:rPr lang="en-GB" sz="3200" dirty="0"/>
-              <a:t>MLP-Mixer: An all-MLP Architecture for Vision</a:t>
-            </a:r>
+            <a:r>
+              <a:rPr lang="en-GB" sz="3200" dirty="0">
+                <a:hlinkClick r:id="rId3"/>
+              </a:rPr>
+              <a:t>Modelling long- and short-term multi-dimensional patterns in predictive maintenance with accumulative attention</a:t>
+            </a:r>
+            <a:endParaRPr lang="en-GB" sz="3200" dirty="0"/>
           </a:p>
         </p:txBody>
       </p:sp>
@@ -6847,17 +8060,10 @@
           <a:p>
             <a:pPr algn="ctr"/>
             <a:r>
-              <a:rPr lang="en-GB" dirty="0"/>
-              <a:t> Advances in Neural Information Processing Systems 34 (</a:t>
-            </a:r>
-            <a:r>
-              <a:rPr lang="en-GB" dirty="0" err="1"/>
-              <a:t>NeurIPS</a:t>
-            </a:r>
-            <a:r>
-              <a:rPr lang="en-GB" dirty="0"/>
-              <a:t> 2021)</a:t>
-            </a:r>
+              <a:rPr lang="en-GB" smtClean="0"/>
+              <a:t>Reliability Engineering &amp; System Safety (Journal) – Elsevier (Publisher) – September 2023</a:t>
+            </a:r>
+            <a:endParaRPr lang="en-GB" dirty="0"/>
           </a:p>
         </p:txBody>
       </p:sp>
@@ -6899,38 +8105,477 @@
       </p:cxnSp>
       <p:pic>
         <p:nvPicPr>
-          <p:cNvPr id="5" name="Picture 4">
-            <a:extLst>
-              <a:ext uri="{FF2B5EF4-FFF2-40B4-BE49-F238E27FC236}">
-                <a16:creationId xmlns:a16="http://schemas.microsoft.com/office/drawing/2014/main" id="{72F258CF-60EB-4D17-9A53-FB61178CA968}"/>
+          <p:cNvPr id="8" name="Picture 4">
+            <a:extLst>
+              <a:ext uri="{FF2B5EF4-FFF2-40B4-BE49-F238E27FC236}">
+                <a16:creationId xmlns:a16="http://schemas.microsoft.com/office/drawing/2014/main" id="{12F4671E-7F92-A5C8-D2AF-A62734D87A76}"/>
               </a:ext>
             </a:extLst>
           </p:cNvPr>
           <p:cNvPicPr>
-            <a:picLocks noChangeAspect="1"/>
+            <a:picLocks noChangeAspect="1" noChangeArrowheads="1"/>
           </p:cNvPicPr>
           <p:nvPr/>
         </p:nvPicPr>
         <p:blipFill>
-          <a:blip r:embed="rId3"/>
+          <a:blip r:embed="rId4" cstate="hqprint">
+            <a:extLst>
+              <a:ext uri="{28A0092B-C50C-407E-A947-70E740481C1C}">
+                <a14:useLocalDpi xmlns:a14="http://schemas.microsoft.com/office/drawing/2010/main" val="0"/>
+              </a:ext>
+            </a:extLst>
+          </a:blip>
+          <a:srcRect/>
           <a:stretch>
             <a:fillRect/>
           </a:stretch>
         </p:blipFill>
-        <p:spPr>
-          <a:xfrm>
-            <a:off x="2017093" y="1042654"/>
-            <a:ext cx="8869013" cy="4772691"/>
+        <p:spPr bwMode="auto">
+          <a:xfrm>
+            <a:off x="7657120" y="1227986"/>
+            <a:ext cx="3806797" cy="4197387"/>
           </a:xfrm>
           <a:prstGeom prst="rect">
             <a:avLst/>
           </a:prstGeom>
+          <a:noFill/>
+          <a:extLst>
+            <a:ext uri="{909E8E84-426E-40DD-AFC4-6F175D3DCCD1}">
+              <a14:hiddenFill xmlns:a14="http://schemas.microsoft.com/office/drawing/2010/main">
+                <a:solidFill>
+                  <a:srgbClr val="FFFFFF"/>
+                </a:solidFill>
+              </a14:hiddenFill>
+            </a:ext>
+          </a:extLst>
         </p:spPr>
       </p:pic>
+      <p:sp>
+        <p:nvSpPr>
+          <p:cNvPr id="9" name="TextBox 8">
+            <a:extLst>
+              <a:ext uri="{FF2B5EF4-FFF2-40B4-BE49-F238E27FC236}">
+                <a16:creationId xmlns:a16="http://schemas.microsoft.com/office/drawing/2014/main" id="{9F35CFDC-F800-F571-791F-0A0EA46A05E8}"/>
+              </a:ext>
+            </a:extLst>
+          </p:cNvPr>
+          <p:cNvSpPr txBox="1"/>
+          <p:nvPr/>
+        </p:nvSpPr>
+        <p:spPr>
+          <a:xfrm>
+            <a:off x="206907" y="1178056"/>
+            <a:ext cx="7450213" cy="4247317"/>
+          </a:xfrm>
+          <a:prstGeom prst="rect">
+            <a:avLst/>
+          </a:prstGeom>
+          <a:noFill/>
+        </p:spPr>
+        <p:txBody>
+          <a:bodyPr wrap="square" rtlCol="0">
+            <a:spAutoFit/>
+          </a:bodyPr>
+          <a:lstStyle/>
+          <a:p>
+            <a:pPr marL="285750" indent="-285750">
+              <a:buFont typeface="Arial" panose="020B0604020202020204" pitchFamily="34" charset="0"/>
+              <a:buChar char="•"/>
+            </a:pPr>
+            <a:r>
+              <a:rPr lang="en-GB" dirty="0"/>
+              <a:t>Temporal Convolution Network (TCN)  - good long-term dependencies &gt;&lt; local patterns </a:t>
+            </a:r>
+          </a:p>
+          <a:p>
+            <a:pPr marL="285750" indent="-285750">
+              <a:buFont typeface="Arial" panose="020B0604020202020204" pitchFamily="34" charset="0"/>
+              <a:buChar char="•"/>
+            </a:pPr>
+            <a:r>
+              <a:rPr lang="en-GB" dirty="0"/>
+              <a:t>Accumulative self-attention layer (ASA)</a:t>
+            </a:r>
+          </a:p>
+          <a:p>
+            <a:pPr marL="285750" indent="-285750">
+              <a:buFont typeface="Arial" panose="020B0604020202020204" pitchFamily="34" charset="0"/>
+              <a:buChar char="•"/>
+            </a:pPr>
+            <a:r>
+              <a:rPr lang="en-GB" dirty="0"/>
+              <a:t>Autoregressive component</a:t>
+            </a:r>
+          </a:p>
+          <a:p>
+            <a:pPr marL="285750" indent="-285750">
+              <a:buFont typeface="Arial" panose="020B0604020202020204" pitchFamily="34" charset="0"/>
+              <a:buChar char="•"/>
+            </a:pPr>
+            <a:r>
+              <a:rPr lang="en-GB" dirty="0"/>
+              <a:t>Lightweight RUL (TCN-ASA)</a:t>
+            </a:r>
+          </a:p>
+          <a:p>
+            <a:pPr marL="285750" indent="-285750">
+              <a:buFont typeface="Arial" panose="020B0604020202020204" pitchFamily="34" charset="0"/>
+              <a:buChar char="•"/>
+            </a:pPr>
+            <a:endParaRPr lang="en-GB" dirty="0"/>
+          </a:p>
+          <a:p>
+            <a:pPr marL="285750" indent="-285750">
+              <a:buFont typeface="Arial" panose="020B0604020202020204" pitchFamily="34" charset="0"/>
+              <a:buChar char="•"/>
+            </a:pPr>
+            <a:endParaRPr lang="en-GB" dirty="0"/>
+          </a:p>
+          <a:p>
+            <a:pPr marL="285750" indent="-285750">
+              <a:buFont typeface="Arial" panose="020B0604020202020204" pitchFamily="34" charset="0"/>
+              <a:buChar char="•"/>
+            </a:pPr>
+            <a:r>
+              <a:rPr lang="en-GB" dirty="0"/>
+              <a:t>Transformer </a:t>
+            </a:r>
+            <a:r>
+              <a:rPr lang="en-GB" dirty="0">
+                <a:sym typeface="Wingdings" panose="05000000000000000000" pitchFamily="2" charset="2"/>
+              </a:rPr>
+              <a:t>Sparse Transformer (Reduce the computational complexity/ some cells are abandoned for attention, which leads information loss)  </a:t>
+            </a:r>
+            <a:r>
+              <a:rPr lang="en-GB" b="1" dirty="0">
+                <a:sym typeface="Wingdings" panose="05000000000000000000" pitchFamily="2" charset="2"/>
+              </a:rPr>
+              <a:t>How to design a lightweight but effective self-attention mechanism?</a:t>
+            </a:r>
+          </a:p>
+          <a:p>
+            <a:endParaRPr lang="en-GB" dirty="0">
+              <a:sym typeface="Wingdings" panose="05000000000000000000" pitchFamily="2" charset="2"/>
+            </a:endParaRPr>
+          </a:p>
+          <a:p>
+            <a:pPr marL="285750" indent="-285750">
+              <a:buFont typeface="Arial" panose="020B0604020202020204" pitchFamily="34" charset="0"/>
+              <a:buChar char="•"/>
+            </a:pPr>
+            <a:r>
+              <a:rPr lang="en-GB" b="1" dirty="0">
+                <a:sym typeface="Wingdings" panose="05000000000000000000" pitchFamily="2" charset="2"/>
+              </a:rPr>
+              <a:t>Research Gap</a:t>
+            </a:r>
+            <a:r>
+              <a:rPr lang="en-GB" dirty="0">
+                <a:sym typeface="Wingdings" panose="05000000000000000000" pitchFamily="2" charset="2"/>
+              </a:rPr>
+              <a:t>: </a:t>
+            </a:r>
+          </a:p>
+          <a:p>
+            <a:pPr marL="742950" lvl="1" indent="-285750">
+              <a:buFont typeface="Arial" panose="020B0604020202020204" pitchFamily="34" charset="0"/>
+              <a:buChar char="•"/>
+            </a:pPr>
+            <a:r>
+              <a:rPr lang="en-GB" dirty="0">
+                <a:sym typeface="Wingdings" panose="05000000000000000000" pitchFamily="2" charset="2"/>
+              </a:rPr>
+              <a:t>sequential models face input length restrictions </a:t>
+            </a:r>
+          </a:p>
+          <a:p>
+            <a:pPr marL="742950" lvl="1" indent="-285750">
+              <a:buFont typeface="Arial" panose="020B0604020202020204" pitchFamily="34" charset="0"/>
+              <a:buChar char="•"/>
+            </a:pPr>
+            <a:r>
+              <a:rPr lang="en-GB" dirty="0">
+                <a:sym typeface="Wingdings" panose="05000000000000000000" pitchFamily="2" charset="2"/>
+              </a:rPr>
+              <a:t>Disadvantages in local feature extraction (temporal and spatial)</a:t>
+            </a:r>
+          </a:p>
+          <a:p>
+            <a:pPr marL="742950" lvl="1" indent="-285750">
+              <a:buFont typeface="Arial" panose="020B0604020202020204" pitchFamily="34" charset="0"/>
+              <a:buChar char="•"/>
+            </a:pPr>
+            <a:r>
+              <a:rPr lang="en-GB" dirty="0">
+                <a:sym typeface="Wingdings" panose="05000000000000000000" pitchFamily="2" charset="2"/>
+              </a:rPr>
+              <a:t>Prediction model is still in shortage for predictive maintenance</a:t>
+            </a:r>
+          </a:p>
+        </p:txBody>
+      </p:sp>
+      <p:sp>
+        <p:nvSpPr>
+          <p:cNvPr id="3" name="Rectangle 2"/>
+          <p:cNvSpPr/>
+          <p:nvPr/>
+        </p:nvSpPr>
+        <p:spPr>
+          <a:xfrm>
+            <a:off x="10439728" y="6332634"/>
+            <a:ext cx="1842620" cy="369332"/>
+          </a:xfrm>
+          <a:prstGeom prst="rect">
+            <a:avLst/>
+          </a:prstGeom>
+        </p:spPr>
+        <p:txBody>
+          <a:bodyPr wrap="none">
+            <a:spAutoFit/>
+          </a:bodyPr>
+          <a:lstStyle/>
+          <a:p>
+            <a:r>
+              <a:rPr lang="en-US" dirty="0"/>
+              <a:t>Review/ </a:t>
+            </a:r>
+            <a:r>
+              <a:rPr lang="en-US" dirty="0">
+                <a:solidFill>
+                  <a:srgbClr val="FF0000"/>
+                </a:solidFill>
+              </a:rPr>
+              <a:t>Methods</a:t>
+            </a:r>
+          </a:p>
+        </p:txBody>
+      </p:sp>
     </p:spTree>
     <p:extLst>
       <p:ext uri="{BB962C8B-B14F-4D97-AF65-F5344CB8AC3E}">
-        <p14:creationId xmlns:p14="http://schemas.microsoft.com/office/powerpoint/2010/main" val="81168443"/>
+        <p14:creationId xmlns:p14="http://schemas.microsoft.com/office/powerpoint/2010/main" val="3885847305"/>
+      </p:ext>
+    </p:extLst>
+  </p:cSld>
+  <p:clrMapOvr>
+    <a:masterClrMapping/>
+  </p:clrMapOvr>
+</p:sld>
+</file>
+
+<file path=ppt/slides/slide9.xml><?xml version="1.0" encoding="utf-8"?>
+<p:sld xmlns:a="http://schemas.openxmlformats.org/drawingml/2006/main" xmlns:r="http://schemas.openxmlformats.org/officeDocument/2006/relationships" xmlns:p="http://schemas.openxmlformats.org/presentationml/2006/main">
+  <p:cSld>
+    <p:spTree>
+      <p:nvGrpSpPr>
+        <p:cNvPr id="1" name=""/>
+        <p:cNvGrpSpPr/>
+        <p:nvPr/>
+      </p:nvGrpSpPr>
+      <p:grpSpPr>
+        <a:xfrm>
+          <a:off x="0" y="0"/>
+          <a:ext cx="0" cy="0"/>
+          <a:chOff x="0" y="0"/>
+          <a:chExt cx="0" cy="0"/>
+        </a:xfrm>
+      </p:grpSpPr>
+      <p:sp>
+        <p:nvSpPr>
+          <p:cNvPr id="2" name="Title 1">
+            <a:extLst>
+              <a:ext uri="{FF2B5EF4-FFF2-40B4-BE49-F238E27FC236}">
+                <a16:creationId xmlns:a16="http://schemas.microsoft.com/office/drawing/2014/main" id="{46A74845-DE20-4B2D-31E7-0C3A96D2C54E}"/>
+              </a:ext>
+            </a:extLst>
+          </p:cNvPr>
+          <p:cNvSpPr>
+            <a:spLocks noGrp="1"/>
+          </p:cNvSpPr>
+          <p:nvPr>
+            <p:ph type="title"/>
+          </p:nvPr>
+        </p:nvSpPr>
+        <p:spPr>
+          <a:xfrm>
+            <a:off x="489397" y="152261"/>
+            <a:ext cx="10773177" cy="581472"/>
+          </a:xfrm>
+        </p:spPr>
+        <p:txBody>
+          <a:bodyPr>
+            <a:normAutofit fontScale="90000"/>
+          </a:bodyPr>
+          <a:lstStyle/>
+          <a:p>
+            <a:r>
+              <a:rPr lang="en-GB" sz="3200" dirty="0">
+                <a:hlinkClick r:id="rId3"/>
+              </a:rPr>
+              <a:t>Modelling long- and short-term multi-dimensional patterns in predictive maintenance with accumulative attention</a:t>
+            </a:r>
+            <a:endParaRPr lang="en-GB" sz="3200" dirty="0"/>
+          </a:p>
+        </p:txBody>
+      </p:sp>
+      <p:sp>
+        <p:nvSpPr>
+          <p:cNvPr id="4" name="TextBox 3">
+            <a:extLst>
+              <a:ext uri="{FF2B5EF4-FFF2-40B4-BE49-F238E27FC236}">
+                <a16:creationId xmlns:a16="http://schemas.microsoft.com/office/drawing/2014/main" id="{68BE6D4C-6FAA-B0A8-A39E-505646A96F89}"/>
+              </a:ext>
+            </a:extLst>
+          </p:cNvPr>
+          <p:cNvSpPr txBox="1"/>
+          <p:nvPr/>
+        </p:nvSpPr>
+        <p:spPr>
+          <a:xfrm>
+            <a:off x="-257577" y="6349286"/>
+            <a:ext cx="12449577" cy="369332"/>
+          </a:xfrm>
+          <a:prstGeom prst="rect">
+            <a:avLst/>
+          </a:prstGeom>
+          <a:noFill/>
+        </p:spPr>
+        <p:txBody>
+          <a:bodyPr wrap="square" rtlCol="0">
+            <a:spAutoFit/>
+          </a:bodyPr>
+          <a:lstStyle/>
+          <a:p>
+            <a:pPr algn="ctr"/>
+            <a:r>
+              <a:rPr lang="en-GB" dirty="0"/>
+              <a:t>Computer &amp; Industrial Engineering (Journal) – Elsevier (Publisher) – December 2020</a:t>
+            </a:r>
+          </a:p>
+        </p:txBody>
+      </p:sp>
+      <p:cxnSp>
+        <p:nvCxnSpPr>
+          <p:cNvPr id="6" name="Straight Connector 5">
+            <a:extLst>
+              <a:ext uri="{FF2B5EF4-FFF2-40B4-BE49-F238E27FC236}">
+                <a16:creationId xmlns:a16="http://schemas.microsoft.com/office/drawing/2014/main" id="{DEE16A59-BE4D-F8DF-F4AA-ABB544D9BCF5}"/>
+              </a:ext>
+            </a:extLst>
+          </p:cNvPr>
+          <p:cNvCxnSpPr/>
+          <p:nvPr/>
+        </p:nvCxnSpPr>
+        <p:spPr>
+          <a:xfrm flipV="1">
+            <a:off x="0" y="6317088"/>
+            <a:ext cx="12192000" cy="64396"/>
+          </a:xfrm>
+          <a:prstGeom prst="line">
+            <a:avLst/>
+          </a:prstGeom>
+        </p:spPr>
+        <p:style>
+          <a:lnRef idx="1">
+            <a:schemeClr val="accent1"/>
+          </a:lnRef>
+          <a:fillRef idx="0">
+            <a:schemeClr val="accent1"/>
+          </a:fillRef>
+          <a:effectRef idx="0">
+            <a:schemeClr val="accent1"/>
+          </a:effectRef>
+          <a:fontRef idx="minor">
+            <a:schemeClr val="tx1"/>
+          </a:fontRef>
+        </p:style>
+      </p:cxnSp>
+      <p:pic>
+        <p:nvPicPr>
+          <p:cNvPr id="3" name="Picture 2" descr="A diagram of a diagram&#10;&#10;Description automatically generated">
+            <a:extLst>
+              <a:ext uri="{FF2B5EF4-FFF2-40B4-BE49-F238E27FC236}">
+                <a16:creationId xmlns:a16="http://schemas.microsoft.com/office/drawing/2014/main" id="{7ECCB0C4-C468-0024-663D-9609DB838F7B}"/>
+              </a:ext>
+            </a:extLst>
+          </p:cNvPr>
+          <p:cNvPicPr>
+            <a:picLocks noChangeAspect="1" noChangeArrowheads="1"/>
+          </p:cNvPicPr>
+          <p:nvPr/>
+        </p:nvPicPr>
+        <p:blipFill>
+          <a:blip r:embed="rId4">
+            <a:extLst>
+              <a:ext uri="{28A0092B-C50C-407E-A947-70E740481C1C}">
+                <a14:useLocalDpi xmlns:a14="http://schemas.microsoft.com/office/drawing/2010/main" val="0"/>
+              </a:ext>
+            </a:extLst>
+          </a:blip>
+          <a:stretch>
+            <a:fillRect/>
+          </a:stretch>
+        </p:blipFill>
+        <p:spPr bwMode="auto">
+          <a:xfrm>
+            <a:off x="1355493" y="1203848"/>
+            <a:ext cx="9223436" cy="4450303"/>
+          </a:xfrm>
+          <a:prstGeom prst="rect">
+            <a:avLst/>
+          </a:prstGeom>
+          <a:noFill/>
+          <a:extLst>
+            <a:ext uri="{909E8E84-426E-40DD-AFC4-6F175D3DCCD1}">
+              <a14:hiddenFill xmlns:a14="http://schemas.microsoft.com/office/drawing/2010/main">
+                <a:solidFill>
+                  <a:srgbClr val="FFFFFF"/>
+                </a:solidFill>
+              </a14:hiddenFill>
+            </a:ext>
+          </a:extLst>
+        </p:spPr>
+      </p:pic>
+      <p:sp>
+        <p:nvSpPr>
+          <p:cNvPr id="7" name="Rectangle 6"/>
+          <p:cNvSpPr/>
+          <p:nvPr/>
+        </p:nvSpPr>
+        <p:spPr>
+          <a:xfrm>
+            <a:off x="10439728" y="6332634"/>
+            <a:ext cx="1842620" cy="369332"/>
+          </a:xfrm>
+          <a:prstGeom prst="rect">
+            <a:avLst/>
+          </a:prstGeom>
+        </p:spPr>
+        <p:txBody>
+          <a:bodyPr wrap="none">
+            <a:spAutoFit/>
+          </a:bodyPr>
+          <a:lstStyle/>
+          <a:p>
+            <a:r>
+              <a:rPr lang="en-US" dirty="0"/>
+              <a:t>Review/ </a:t>
+            </a:r>
+            <a:r>
+              <a:rPr lang="en-US" dirty="0">
+                <a:solidFill>
+                  <a:srgbClr val="FF0000"/>
+                </a:solidFill>
+              </a:rPr>
+              <a:t>Methods</a:t>
+            </a:r>
+          </a:p>
+        </p:txBody>
+      </p:sp>
+    </p:spTree>
+    <p:extLst>
+      <p:ext uri="{BB962C8B-B14F-4D97-AF65-F5344CB8AC3E}">
+        <p14:creationId xmlns:p14="http://schemas.microsoft.com/office/powerpoint/2010/main" val="2621861322"/>
       </p:ext>
     </p:extLst>
   </p:cSld>

</xml_diff>